<commit_message>
cambios visuales: mejora en las vistas y eliminacion de mayusculas en botones, arreglo de margenes
</commit_message>
<xml_diff>
--- a/docs/presentacion/presentacion producto final Pasantias.pptx
+++ b/docs/presentacion/presentacion producto final Pasantias.pptx
@@ -5,10 +5,10 @@
     <p:sldMasterId id="2147483684" r:id="rId1"/>
   </p:sldMasterIdLst>
   <p:notesMasterIdLst>
-    <p:notesMasterId r:id="rId21"/>
+    <p:notesMasterId r:id="rId20"/>
   </p:notesMasterIdLst>
   <p:handoutMasterIdLst>
-    <p:handoutMasterId r:id="rId22"/>
+    <p:handoutMasterId r:id="rId21"/>
   </p:handoutMasterIdLst>
   <p:sldIdLst>
     <p:sldId id="256" r:id="rId2"/>
@@ -29,7 +29,6 @@
     <p:sldId id="273" r:id="rId17"/>
     <p:sldId id="274" r:id="rId18"/>
     <p:sldId id="275" r:id="rId19"/>
-    <p:sldId id="261" r:id="rId20"/>
   </p:sldIdLst>
   <p:sldSz cx="9144000" cy="6858000" type="screen4x3"/>
   <p:notesSz cx="6858000" cy="9144000"/>
@@ -213,7 +212,7 @@
           <a:p>
             <a:fld id="{653EA24F-18F7-4F91-9359-C9F9A023D2A2}" type="datetimeFigureOut">
               <a:rPr lang="es-VE" smtClean="0"/>
-              <a:t>8/10/2020</a:t>
+              <a:t>15/10/2020</a:t>
             </a:fld>
             <a:endParaRPr lang="es-VE"/>
           </a:p>
@@ -378,7 +377,7 @@
           <a:p>
             <a:fld id="{A63708E0-4069-43F6-B2CC-04F03E348597}" type="datetimeFigureOut">
               <a:rPr lang="es-VE" smtClean="0"/>
-              <a:t>8/10/2020</a:t>
+              <a:t>15/10/2020</a:t>
             </a:fld>
             <a:endParaRPr lang="es-VE"/>
           </a:p>
@@ -924,7 +923,7 @@
           <a:p>
             <a:fld id="{3A081D1D-6BD6-40F4-80EB-C898E09F6268}" type="datetimeFigureOut">
               <a:rPr lang="es-VE" smtClean="0"/>
-              <a:t>8/10/2020</a:t>
+              <a:t>15/10/2020</a:t>
             </a:fld>
             <a:endParaRPr lang="es-VE"/>
           </a:p>
@@ -1101,7 +1100,7 @@
           <a:p>
             <a:fld id="{3A081D1D-6BD6-40F4-80EB-C898E09F6268}" type="datetimeFigureOut">
               <a:rPr lang="es-VE" smtClean="0"/>
-              <a:t>8/10/2020</a:t>
+              <a:t>15/10/2020</a:t>
             </a:fld>
             <a:endParaRPr lang="es-VE"/>
           </a:p>
@@ -1288,7 +1287,7 @@
           <a:p>
             <a:fld id="{3A081D1D-6BD6-40F4-80EB-C898E09F6268}" type="datetimeFigureOut">
               <a:rPr lang="es-VE" smtClean="0"/>
-              <a:t>8/10/2020</a:t>
+              <a:t>15/10/2020</a:t>
             </a:fld>
             <a:endParaRPr lang="es-VE"/>
           </a:p>
@@ -1465,7 +1464,7 @@
           <a:p>
             <a:fld id="{3A081D1D-6BD6-40F4-80EB-C898E09F6268}" type="datetimeFigureOut">
               <a:rPr lang="es-VE" smtClean="0"/>
-              <a:t>8/10/2020</a:t>
+              <a:t>15/10/2020</a:t>
             </a:fld>
             <a:endParaRPr lang="es-VE"/>
           </a:p>
@@ -1718,7 +1717,7 @@
           <a:p>
             <a:fld id="{3A081D1D-6BD6-40F4-80EB-C898E09F6268}" type="datetimeFigureOut">
               <a:rPr lang="es-VE" smtClean="0"/>
-              <a:t>8/10/2020</a:t>
+              <a:t>15/10/2020</a:t>
             </a:fld>
             <a:endParaRPr lang="es-VE"/>
           </a:p>
@@ -2013,7 +2012,7 @@
           <a:p>
             <a:fld id="{3A081D1D-6BD6-40F4-80EB-C898E09F6268}" type="datetimeFigureOut">
               <a:rPr lang="es-VE" smtClean="0"/>
-              <a:t>8/10/2020</a:t>
+              <a:t>15/10/2020</a:t>
             </a:fld>
             <a:endParaRPr lang="es-VE"/>
           </a:p>
@@ -2454,7 +2453,7 @@
           <a:p>
             <a:fld id="{3A081D1D-6BD6-40F4-80EB-C898E09F6268}" type="datetimeFigureOut">
               <a:rPr lang="es-VE" smtClean="0"/>
-              <a:t>8/10/2020</a:t>
+              <a:t>15/10/2020</a:t>
             </a:fld>
             <a:endParaRPr lang="es-VE"/>
           </a:p>
@@ -2579,7 +2578,7 @@
           <a:p>
             <a:fld id="{3A081D1D-6BD6-40F4-80EB-C898E09F6268}" type="datetimeFigureOut">
               <a:rPr lang="es-VE" smtClean="0"/>
-              <a:t>8/10/2020</a:t>
+              <a:t>15/10/2020</a:t>
             </a:fld>
             <a:endParaRPr lang="es-VE"/>
           </a:p>
@@ -2681,7 +2680,7 @@
           <a:p>
             <a:fld id="{3A081D1D-6BD6-40F4-80EB-C898E09F6268}" type="datetimeFigureOut">
               <a:rPr lang="es-VE" smtClean="0"/>
-              <a:t>8/10/2020</a:t>
+              <a:t>15/10/2020</a:t>
             </a:fld>
             <a:endParaRPr lang="es-VE"/>
           </a:p>
@@ -2882,7 +2881,7 @@
           <a:p>
             <a:fld id="{3A081D1D-6BD6-40F4-80EB-C898E09F6268}" type="datetimeFigureOut">
               <a:rPr lang="es-VE" smtClean="0"/>
-              <a:t>8/10/2020</a:t>
+              <a:t>15/10/2020</a:t>
             </a:fld>
             <a:endParaRPr lang="es-VE"/>
           </a:p>
@@ -3212,7 +3211,7 @@
           <a:p>
             <a:fld id="{3A081D1D-6BD6-40F4-80EB-C898E09F6268}" type="datetimeFigureOut">
               <a:rPr lang="es-VE" smtClean="0"/>
-              <a:t>8/10/2020</a:t>
+              <a:t>15/10/2020</a:t>
             </a:fld>
             <a:endParaRPr lang="es-VE"/>
           </a:p>
@@ -3603,7 +3602,7 @@
           <a:p>
             <a:fld id="{3A081D1D-6BD6-40F4-80EB-C898E09F6268}" type="datetimeFigureOut">
               <a:rPr lang="es-VE" smtClean="0"/>
-              <a:t>8/10/2020</a:t>
+              <a:t>15/10/2020</a:t>
             </a:fld>
             <a:endParaRPr lang="es-VE"/>
           </a:p>
@@ -4462,9 +4461,44 @@
           </a:extLst>
         </p:spPr>
       </p:pic>
+      <p:cxnSp>
+        <p:nvCxnSpPr>
+          <p:cNvPr id="6" name="5 Conector curvado"/>
+          <p:cNvCxnSpPr/>
+          <p:nvPr/>
+        </p:nvCxnSpPr>
+        <p:spPr>
+          <a:xfrm rot="5400000" flipH="1" flipV="1">
+            <a:off x="3925694" y="970756"/>
+            <a:ext cx="12700" cy="3188297"/>
+          </a:xfrm>
+          <a:prstGeom prst="curvedConnector3">
+            <a:avLst>
+              <a:gd name="adj1" fmla="val 3375008"/>
+            </a:avLst>
+          </a:prstGeom>
+          <a:ln>
+            <a:tailEnd type="arrow"/>
+          </a:ln>
+        </p:spPr>
+        <p:style>
+          <a:lnRef idx="3">
+            <a:schemeClr val="accent1"/>
+          </a:lnRef>
+          <a:fillRef idx="0">
+            <a:schemeClr val="accent1"/>
+          </a:fillRef>
+          <a:effectRef idx="2">
+            <a:schemeClr val="accent1"/>
+          </a:effectRef>
+          <a:fontRef idx="minor">
+            <a:schemeClr val="tx1"/>
+          </a:fontRef>
+        </p:style>
+      </p:cxnSp>
       <p:pic>
         <p:nvPicPr>
-          <p:cNvPr id="13314" name="Picture 2"/>
+          <p:cNvPr id="4098" name="Picture 2"/>
           <p:cNvPicPr>
             <a:picLocks noChangeAspect="1" noChangeArrowheads="1"/>
           </p:cNvPicPr>
@@ -4485,8 +4519,8 @@
         </p:blipFill>
         <p:spPr bwMode="auto">
           <a:xfrm>
-            <a:off x="1259633" y="2564904"/>
-            <a:ext cx="2143826" cy="3865587"/>
+            <a:off x="1253638" y="2558554"/>
+            <a:ext cx="2168513" cy="3838673"/>
           </a:xfrm>
           <a:prstGeom prst="rect">
             <a:avLst/>
@@ -4525,7 +4559,7 @@
       </p:pic>
       <p:pic>
         <p:nvPicPr>
-          <p:cNvPr id="13315" name="Picture 3"/>
+          <p:cNvPr id="4099" name="Picture 3"/>
           <p:cNvPicPr>
             <a:picLocks noChangeAspect="1" noChangeArrowheads="1"/>
           </p:cNvPicPr>
@@ -4546,8 +4580,8 @@
         </p:blipFill>
         <p:spPr bwMode="auto">
           <a:xfrm>
-            <a:off x="4427984" y="2564904"/>
-            <a:ext cx="2183717" cy="3865587"/>
+            <a:off x="4424816" y="2571255"/>
+            <a:ext cx="2154627" cy="3825972"/>
           </a:xfrm>
           <a:prstGeom prst="rect">
             <a:avLst/>
@@ -4584,44 +4618,6 @@
           </a:extLst>
         </p:spPr>
       </p:pic>
-      <p:cxnSp>
-        <p:nvCxnSpPr>
-          <p:cNvPr id="6" name="5 Conector curvado"/>
-          <p:cNvCxnSpPr>
-            <a:stCxn id="13314" idx="0"/>
-            <a:endCxn id="13315" idx="0"/>
-          </p:cNvCxnSpPr>
-          <p:nvPr/>
-        </p:nvCxnSpPr>
-        <p:spPr>
-          <a:xfrm rot="5400000" flipH="1" flipV="1">
-            <a:off x="3925694" y="970756"/>
-            <a:ext cx="12700" cy="3188297"/>
-          </a:xfrm>
-          <a:prstGeom prst="curvedConnector3">
-            <a:avLst>
-              <a:gd name="adj1" fmla="val 3375008"/>
-            </a:avLst>
-          </a:prstGeom>
-          <a:ln>
-            <a:tailEnd type="arrow"/>
-          </a:ln>
-        </p:spPr>
-        <p:style>
-          <a:lnRef idx="3">
-            <a:schemeClr val="accent1"/>
-          </a:lnRef>
-          <a:fillRef idx="0">
-            <a:schemeClr val="accent1"/>
-          </a:fillRef>
-          <a:effectRef idx="2">
-            <a:schemeClr val="accent1"/>
-          </a:effectRef>
-          <a:fontRef idx="minor">
-            <a:schemeClr val="tx1"/>
-          </a:fontRef>
-        </p:style>
-      </p:cxnSp>
     </p:spTree>
     <p:extLst>
       <p:ext uri="{BB962C8B-B14F-4D97-AF65-F5344CB8AC3E}">
@@ -4671,6 +4667,128 @@
           <a:chExt cx="0" cy="0"/>
         </a:xfrm>
       </p:grpSpPr>
+      <p:pic>
+        <p:nvPicPr>
+          <p:cNvPr id="5123" name="Picture 3"/>
+          <p:cNvPicPr>
+            <a:picLocks noChangeAspect="1" noChangeArrowheads="1"/>
+          </p:cNvPicPr>
+          <p:nvPr/>
+        </p:nvPicPr>
+        <p:blipFill>
+          <a:blip r:embed="rId2">
+            <a:extLst>
+              <a:ext uri="{28A0092B-C50C-407E-A947-70E740481C1C}">
+                <a14:useLocalDpi xmlns:a14="http://schemas.microsoft.com/office/drawing/2010/main" val="0"/>
+              </a:ext>
+            </a:extLst>
+          </a:blip>
+          <a:srcRect/>
+          <a:stretch>
+            <a:fillRect/>
+          </a:stretch>
+        </p:blipFill>
+        <p:spPr bwMode="auto">
+          <a:xfrm>
+            <a:off x="5110732" y="2420887"/>
+            <a:ext cx="2197571" cy="3869637"/>
+          </a:xfrm>
+          <a:prstGeom prst="rect">
+            <a:avLst/>
+          </a:prstGeom>
+          <a:noFill/>
+          <a:ln>
+            <a:noFill/>
+          </a:ln>
+          <a:effectLst>
+            <a:outerShdw blurRad="63500" sx="102000" sy="102000" algn="ctr" rotWithShape="0">
+              <a:prstClr val="black">
+                <a:alpha val="40000"/>
+              </a:prstClr>
+            </a:outerShdw>
+          </a:effectLst>
+          <a:extLst>
+            <a:ext uri="{909E8E84-426E-40DD-AFC4-6F175D3DCCD1}">
+              <a14:hiddenFill xmlns:a14="http://schemas.microsoft.com/office/drawing/2010/main">
+                <a:solidFill>
+                  <a:schemeClr val="accent1"/>
+                </a:solidFill>
+              </a14:hiddenFill>
+            </a:ext>
+            <a:ext uri="{91240B29-F687-4F45-9708-019B960494DF}">
+              <a14:hiddenLine xmlns:a14="http://schemas.microsoft.com/office/drawing/2010/main" w="9525">
+                <a:solidFill>
+                  <a:schemeClr val="tx1"/>
+                </a:solidFill>
+                <a:miter lim="800000"/>
+                <a:headEnd/>
+                <a:tailEnd/>
+              </a14:hiddenLine>
+            </a:ext>
+          </a:extLst>
+        </p:spPr>
+      </p:pic>
+      <p:pic>
+        <p:nvPicPr>
+          <p:cNvPr id="5122" name="Picture 2"/>
+          <p:cNvPicPr>
+            <a:picLocks noChangeAspect="1" noChangeArrowheads="1"/>
+          </p:cNvPicPr>
+          <p:nvPr/>
+        </p:nvPicPr>
+        <p:blipFill>
+          <a:blip r:embed="rId3">
+            <a:extLst>
+              <a:ext uri="{28A0092B-C50C-407E-A947-70E740481C1C}">
+                <a14:useLocalDpi xmlns:a14="http://schemas.microsoft.com/office/drawing/2010/main" val="0"/>
+              </a:ext>
+            </a:extLst>
+          </a:blip>
+          <a:srcRect/>
+          <a:stretch>
+            <a:fillRect/>
+          </a:stretch>
+        </p:blipFill>
+        <p:spPr bwMode="auto">
+          <a:xfrm>
+            <a:off x="1242169" y="2407048"/>
+            <a:ext cx="2167436" cy="3852465"/>
+          </a:xfrm>
+          <a:prstGeom prst="rect">
+            <a:avLst/>
+          </a:prstGeom>
+          <a:noFill/>
+          <a:ln>
+            <a:noFill/>
+          </a:ln>
+          <a:effectLst>
+            <a:outerShdw blurRad="63500" sx="102000" sy="102000" algn="ctr" rotWithShape="0">
+              <a:prstClr val="black">
+                <a:alpha val="40000"/>
+              </a:prstClr>
+            </a:outerShdw>
+          </a:effectLst>
+          <a:extLst>
+            <a:ext uri="{909E8E84-426E-40DD-AFC4-6F175D3DCCD1}">
+              <a14:hiddenFill xmlns:a14="http://schemas.microsoft.com/office/drawing/2010/main">
+                <a:solidFill>
+                  <a:schemeClr val="accent1"/>
+                </a:solidFill>
+              </a14:hiddenFill>
+            </a:ext>
+            <a:ext uri="{91240B29-F687-4F45-9708-019B960494DF}">
+              <a14:hiddenLine xmlns:a14="http://schemas.microsoft.com/office/drawing/2010/main" w="9525">
+                <a:solidFill>
+                  <a:schemeClr val="tx1"/>
+                </a:solidFill>
+                <a:miter lim="800000"/>
+                <a:headEnd/>
+                <a:tailEnd/>
+              </a14:hiddenLine>
+            </a:ext>
+          </a:extLst>
+        </p:spPr>
+      </p:pic>
       <p:sp>
         <p:nvSpPr>
           <p:cNvPr id="2" name="1 Título"/>
@@ -4733,7 +4851,7 @@
           <p:nvPr/>
         </p:nvPicPr>
         <p:blipFill>
-          <a:blip r:embed="rId2">
+          <a:blip r:embed="rId4">
             <a:extLst>
               <a:ext uri="{28A0092B-C50C-407E-A947-70E740481C1C}">
                 <a14:useLocalDpi xmlns:a14="http://schemas.microsoft.com/office/drawing/2010/main" val="0"/>
@@ -4796,77 +4914,18 @@
           </a:extLst>
         </p:spPr>
       </p:pic>
-      <p:pic>
-        <p:nvPicPr>
-          <p:cNvPr id="14338" name="Picture 2"/>
-          <p:cNvPicPr>
-            <a:picLocks noChangeAspect="1" noChangeArrowheads="1"/>
-          </p:cNvPicPr>
-          <p:nvPr/>
-        </p:nvPicPr>
-        <p:blipFill>
-          <a:blip r:embed="rId3">
-            <a:extLst>
-              <a:ext uri="{28A0092B-C50C-407E-A947-70E740481C1C}">
-                <a14:useLocalDpi xmlns:a14="http://schemas.microsoft.com/office/drawing/2010/main" val="0"/>
-              </a:ext>
-            </a:extLst>
-          </a:blip>
-          <a:srcRect/>
-          <a:stretch>
-            <a:fillRect/>
-          </a:stretch>
-        </p:blipFill>
-        <p:spPr bwMode="auto">
-          <a:xfrm>
-            <a:off x="1259632" y="2420888"/>
-            <a:ext cx="2190356" cy="3856932"/>
-          </a:xfrm>
-          <a:prstGeom prst="rect">
-            <a:avLst/>
-          </a:prstGeom>
-          <a:noFill/>
-          <a:ln>
-            <a:noFill/>
-          </a:ln>
-          <a:effectLst>
-            <a:outerShdw blurRad="63500" sx="102000" sy="102000" algn="ctr" rotWithShape="0">
-              <a:prstClr val="black">
-                <a:alpha val="40000"/>
-              </a:prstClr>
-            </a:outerShdw>
-          </a:effectLst>
-          <a:extLst>
-            <a:ext uri="{909E8E84-426E-40DD-AFC4-6F175D3DCCD1}">
-              <a14:hiddenFill xmlns:a14="http://schemas.microsoft.com/office/drawing/2010/main">
-                <a:solidFill>
-                  <a:schemeClr val="accent1"/>
-                </a:solidFill>
-              </a14:hiddenFill>
-            </a:ext>
-            <a:ext uri="{91240B29-F687-4F45-9708-019B960494DF}">
-              <a14:hiddenLine xmlns:a14="http://schemas.microsoft.com/office/drawing/2010/main" w="9525">
-                <a:solidFill>
-                  <a:schemeClr val="tx1"/>
-                </a:solidFill>
-                <a:miter lim="800000"/>
-                <a:headEnd/>
-                <a:tailEnd/>
-              </a14:hiddenLine>
-            </a:ext>
-          </a:extLst>
-        </p:spPr>
-      </p:pic>
       <p:cxnSp>
         <p:nvCxnSpPr>
           <p:cNvPr id="6" name="5 Conector recto de flecha"/>
-          <p:cNvCxnSpPr/>
+          <p:cNvCxnSpPr>
+            <a:endCxn id="14" idx="1"/>
+          </p:cNvCxnSpPr>
           <p:nvPr/>
         </p:nvCxnSpPr>
         <p:spPr>
-          <a:xfrm flipV="1">
-            <a:off x="2699792" y="3681028"/>
-            <a:ext cx="1113425" cy="252028"/>
+          <a:xfrm>
+            <a:off x="2699792" y="3527138"/>
+            <a:ext cx="936104" cy="1"/>
           </a:xfrm>
           <a:prstGeom prst="straightConnector1">
             <a:avLst/>
@@ -4890,74 +4949,10 @@
           </a:fontRef>
         </p:style>
       </p:cxnSp>
-      <p:pic>
-        <p:nvPicPr>
-          <p:cNvPr id="14339" name="Picture 3"/>
-          <p:cNvPicPr>
-            <a:picLocks noChangeAspect="1" noChangeArrowheads="1"/>
-          </p:cNvPicPr>
-          <p:nvPr/>
-        </p:nvPicPr>
-        <p:blipFill>
-          <a:blip r:embed="rId4">
-            <a:extLst>
-              <a:ext uri="{28A0092B-C50C-407E-A947-70E740481C1C}">
-                <a14:useLocalDpi xmlns:a14="http://schemas.microsoft.com/office/drawing/2010/main" val="0"/>
-              </a:ext>
-            </a:extLst>
-          </a:blip>
-          <a:srcRect/>
-          <a:stretch>
-            <a:fillRect/>
-          </a:stretch>
-        </p:blipFill>
-        <p:spPr bwMode="auto">
-          <a:xfrm>
-            <a:off x="5148064" y="2420889"/>
-            <a:ext cx="2049700" cy="3633268"/>
-          </a:xfrm>
-          <a:prstGeom prst="rect">
-            <a:avLst/>
-          </a:prstGeom>
-          <a:noFill/>
-          <a:ln>
-            <a:noFill/>
-          </a:ln>
-          <a:effectLst>
-            <a:outerShdw blurRad="63500" sx="102000" sy="102000" algn="ctr" rotWithShape="0">
-              <a:prstClr val="black">
-                <a:alpha val="40000"/>
-              </a:prstClr>
-            </a:outerShdw>
-          </a:effectLst>
-          <a:extLst>
-            <a:ext uri="{909E8E84-426E-40DD-AFC4-6F175D3DCCD1}">
-              <a14:hiddenFill xmlns:a14="http://schemas.microsoft.com/office/drawing/2010/main">
-                <a:solidFill>
-                  <a:schemeClr val="accent1"/>
-                </a:solidFill>
-              </a14:hiddenFill>
-            </a:ext>
-            <a:ext uri="{91240B29-F687-4F45-9708-019B960494DF}">
-              <a14:hiddenLine xmlns:a14="http://schemas.microsoft.com/office/drawing/2010/main" w="9525">
-                <a:solidFill>
-                  <a:schemeClr val="tx1"/>
-                </a:solidFill>
-                <a:miter lim="800000"/>
-                <a:headEnd/>
-                <a:tailEnd/>
-              </a14:hiddenLine>
-            </a:ext>
-          </a:extLst>
-        </p:spPr>
-      </p:pic>
       <p:cxnSp>
         <p:nvCxnSpPr>
           <p:cNvPr id="9" name="8 Conector curvado"/>
-          <p:cNvCxnSpPr>
-            <a:stCxn id="14338" idx="0"/>
-            <a:endCxn id="14339" idx="0"/>
-          </p:cNvCxnSpPr>
+          <p:cNvCxnSpPr/>
           <p:nvPr/>
         </p:nvCxnSpPr>
         <p:spPr>
@@ -5031,7 +5026,7 @@
         </p:nvSpPr>
         <p:spPr>
           <a:xfrm>
-            <a:off x="4067944" y="6123931"/>
+            <a:off x="3650534" y="6249344"/>
             <a:ext cx="2558983" cy="307777"/>
           </a:xfrm>
           <a:prstGeom prst="rect">
@@ -5061,8 +5056,8 @@
         </p:nvCxnSpPr>
         <p:spPr>
           <a:xfrm flipH="1">
-            <a:off x="4437893" y="5805264"/>
-            <a:ext cx="710171" cy="318667"/>
+            <a:off x="4437894" y="5964597"/>
+            <a:ext cx="710170" cy="159334"/>
           </a:xfrm>
           <a:prstGeom prst="straightConnector1">
             <a:avLst/>
@@ -5137,7 +5132,7 @@
       </p:grpSpPr>
       <p:pic>
         <p:nvPicPr>
-          <p:cNvPr id="2050" name="Picture 2"/>
+          <p:cNvPr id="6146" name="Picture 2"/>
           <p:cNvPicPr>
             <a:picLocks noChangeAspect="1" noChangeArrowheads="1"/>
           </p:cNvPicPr>
@@ -5158,8 +5153,8 @@
         </p:blipFill>
         <p:spPr bwMode="auto">
           <a:xfrm>
-            <a:off x="864337" y="3011867"/>
-            <a:ext cx="1459242" cy="3004857"/>
+            <a:off x="710868" y="2967505"/>
+            <a:ext cx="1648522" cy="2902832"/>
           </a:xfrm>
           <a:prstGeom prst="rect">
             <a:avLst/>
@@ -5321,195 +5316,10 @@
           </a:extLst>
         </p:spPr>
       </p:pic>
-      <p:pic>
-        <p:nvPicPr>
-          <p:cNvPr id="15364" name="Picture 4"/>
-          <p:cNvPicPr>
-            <a:picLocks noChangeAspect="1" noChangeArrowheads="1"/>
-          </p:cNvPicPr>
-          <p:nvPr/>
-        </p:nvPicPr>
-        <p:blipFill>
-          <a:blip r:embed="rId4">
-            <a:extLst>
-              <a:ext uri="{28A0092B-C50C-407E-A947-70E740481C1C}">
-                <a14:useLocalDpi xmlns:a14="http://schemas.microsoft.com/office/drawing/2010/main" val="0"/>
-              </a:ext>
-            </a:extLst>
-          </a:blip>
-          <a:srcRect/>
-          <a:stretch>
-            <a:fillRect/>
-          </a:stretch>
-        </p:blipFill>
-        <p:spPr bwMode="auto">
-          <a:xfrm>
-            <a:off x="2469871" y="2390774"/>
-            <a:ext cx="1626508" cy="2907382"/>
-          </a:xfrm>
-          <a:prstGeom prst="rect">
-            <a:avLst/>
-          </a:prstGeom>
-          <a:noFill/>
-          <a:ln>
-            <a:noFill/>
-          </a:ln>
-          <a:effectLst>
-            <a:outerShdw blurRad="63500" sx="102000" sy="102000" algn="ctr" rotWithShape="0">
-              <a:prstClr val="black">
-                <a:alpha val="40000"/>
-              </a:prstClr>
-            </a:outerShdw>
-          </a:effectLst>
-          <a:extLst>
-            <a:ext uri="{909E8E84-426E-40DD-AFC4-6F175D3DCCD1}">
-              <a14:hiddenFill xmlns:a14="http://schemas.microsoft.com/office/drawing/2010/main">
-                <a:solidFill>
-                  <a:schemeClr val="accent1"/>
-                </a:solidFill>
-              </a14:hiddenFill>
-            </a:ext>
-            <a:ext uri="{91240B29-F687-4F45-9708-019B960494DF}">
-              <a14:hiddenLine xmlns:a14="http://schemas.microsoft.com/office/drawing/2010/main" w="9525">
-                <a:solidFill>
-                  <a:schemeClr val="tx1"/>
-                </a:solidFill>
-                <a:miter lim="800000"/>
-                <a:headEnd/>
-                <a:tailEnd/>
-              </a14:hiddenLine>
-            </a:ext>
-          </a:extLst>
-        </p:spPr>
-      </p:pic>
-      <p:pic>
-        <p:nvPicPr>
-          <p:cNvPr id="15365" name="Picture 5"/>
-          <p:cNvPicPr>
-            <a:picLocks noChangeAspect="1" noChangeArrowheads="1"/>
-          </p:cNvPicPr>
-          <p:nvPr/>
-        </p:nvPicPr>
-        <p:blipFill>
-          <a:blip r:embed="rId5">
-            <a:extLst>
-              <a:ext uri="{28A0092B-C50C-407E-A947-70E740481C1C}">
-                <a14:useLocalDpi xmlns:a14="http://schemas.microsoft.com/office/drawing/2010/main" val="0"/>
-              </a:ext>
-            </a:extLst>
-          </a:blip>
-          <a:srcRect/>
-          <a:stretch>
-            <a:fillRect/>
-          </a:stretch>
-        </p:blipFill>
-        <p:spPr bwMode="auto">
-          <a:xfrm>
-            <a:off x="4195109" y="2958853"/>
-            <a:ext cx="1934281" cy="3434705"/>
-          </a:xfrm>
-          <a:prstGeom prst="rect">
-            <a:avLst/>
-          </a:prstGeom>
-          <a:noFill/>
-          <a:ln>
-            <a:noFill/>
-          </a:ln>
-          <a:effectLst>
-            <a:outerShdw blurRad="63500" sx="102000" sy="102000" algn="ctr" rotWithShape="0">
-              <a:prstClr val="black">
-                <a:alpha val="40000"/>
-              </a:prstClr>
-            </a:outerShdw>
-          </a:effectLst>
-          <a:extLst>
-            <a:ext uri="{909E8E84-426E-40DD-AFC4-6F175D3DCCD1}">
-              <a14:hiddenFill xmlns:a14="http://schemas.microsoft.com/office/drawing/2010/main">
-                <a:solidFill>
-                  <a:schemeClr val="accent1"/>
-                </a:solidFill>
-              </a14:hiddenFill>
-            </a:ext>
-            <a:ext uri="{91240B29-F687-4F45-9708-019B960494DF}">
-              <a14:hiddenLine xmlns:a14="http://schemas.microsoft.com/office/drawing/2010/main" w="9525">
-                <a:solidFill>
-                  <a:schemeClr val="tx1"/>
-                </a:solidFill>
-                <a:miter lim="800000"/>
-                <a:headEnd/>
-                <a:tailEnd/>
-              </a14:hiddenLine>
-            </a:ext>
-          </a:extLst>
-        </p:spPr>
-      </p:pic>
-      <p:pic>
-        <p:nvPicPr>
-          <p:cNvPr id="15366" name="Picture 6"/>
-          <p:cNvPicPr>
-            <a:picLocks noChangeAspect="1" noChangeArrowheads="1"/>
-          </p:cNvPicPr>
-          <p:nvPr/>
-        </p:nvPicPr>
-        <p:blipFill>
-          <a:blip r:embed="rId6">
-            <a:extLst>
-              <a:ext uri="{28A0092B-C50C-407E-A947-70E740481C1C}">
-                <a14:useLocalDpi xmlns:a14="http://schemas.microsoft.com/office/drawing/2010/main" val="0"/>
-              </a:ext>
-            </a:extLst>
-          </a:blip>
-          <a:srcRect/>
-          <a:stretch>
-            <a:fillRect/>
-          </a:stretch>
-        </p:blipFill>
-        <p:spPr bwMode="auto">
-          <a:xfrm>
-            <a:off x="6223802" y="2404492"/>
-            <a:ext cx="1935045" cy="3434705"/>
-          </a:xfrm>
-          <a:prstGeom prst="rect">
-            <a:avLst/>
-          </a:prstGeom>
-          <a:noFill/>
-          <a:ln>
-            <a:noFill/>
-          </a:ln>
-          <a:effectLst>
-            <a:outerShdw blurRad="63500" sx="102000" sy="102000" algn="ctr" rotWithShape="0">
-              <a:prstClr val="black">
-                <a:alpha val="40000"/>
-              </a:prstClr>
-            </a:outerShdw>
-          </a:effectLst>
-          <a:extLst>
-            <a:ext uri="{909E8E84-426E-40DD-AFC4-6F175D3DCCD1}">
-              <a14:hiddenFill xmlns:a14="http://schemas.microsoft.com/office/drawing/2010/main">
-                <a:solidFill>
-                  <a:schemeClr val="accent1"/>
-                </a:solidFill>
-              </a14:hiddenFill>
-            </a:ext>
-            <a:ext uri="{91240B29-F687-4F45-9708-019B960494DF}">
-              <a14:hiddenLine xmlns:a14="http://schemas.microsoft.com/office/drawing/2010/main" w="9525">
-                <a:solidFill>
-                  <a:schemeClr val="tx1"/>
-                </a:solidFill>
-                <a:miter lim="800000"/>
-                <a:headEnd/>
-                <a:tailEnd/>
-              </a14:hiddenLine>
-            </a:ext>
-          </a:extLst>
-        </p:spPr>
-      </p:pic>
       <p:cxnSp>
         <p:nvCxnSpPr>
           <p:cNvPr id="6" name="5 Conector curvado"/>
-          <p:cNvCxnSpPr>
-            <a:endCxn id="15364" idx="0"/>
-          </p:cNvCxnSpPr>
+          <p:cNvCxnSpPr/>
           <p:nvPr/>
         </p:nvCxnSpPr>
         <p:spPr>
@@ -5544,10 +5354,7 @@
       <p:cxnSp>
         <p:nvCxnSpPr>
           <p:cNvPr id="12" name="11 Conector curvado"/>
-          <p:cNvCxnSpPr>
-            <a:stCxn id="15364" idx="0"/>
-            <a:endCxn id="15365" idx="0"/>
-          </p:cNvCxnSpPr>
+          <p:cNvCxnSpPr/>
           <p:nvPr/>
         </p:nvCxnSpPr>
         <p:spPr>
@@ -5579,44 +5386,6 @@
           </a:fontRef>
         </p:style>
       </p:cxnSp>
-      <p:cxnSp>
-        <p:nvCxnSpPr>
-          <p:cNvPr id="15" name="14 Conector curvado"/>
-          <p:cNvCxnSpPr>
-            <a:stCxn id="15365" idx="0"/>
-            <a:endCxn id="15366" idx="0"/>
-          </p:cNvCxnSpPr>
-          <p:nvPr/>
-        </p:nvCxnSpPr>
-        <p:spPr>
-          <a:xfrm rot="5400000" flipH="1" flipV="1">
-            <a:off x="5899607" y="1667136"/>
-            <a:ext cx="554361" cy="2029075"/>
-          </a:xfrm>
-          <a:prstGeom prst="curvedConnector3">
-            <a:avLst>
-              <a:gd name="adj1" fmla="val 141237"/>
-            </a:avLst>
-          </a:prstGeom>
-          <a:ln>
-            <a:tailEnd type="arrow"/>
-          </a:ln>
-        </p:spPr>
-        <p:style>
-          <a:lnRef idx="3">
-            <a:schemeClr val="accent1"/>
-          </a:lnRef>
-          <a:fillRef idx="0">
-            <a:schemeClr val="accent1"/>
-          </a:fillRef>
-          <a:effectRef idx="2">
-            <a:schemeClr val="accent1"/>
-          </a:effectRef>
-          <a:fontRef idx="minor">
-            <a:schemeClr val="tx1"/>
-          </a:fontRef>
-        </p:style>
-      </p:cxnSp>
       <p:sp>
         <p:nvSpPr>
           <p:cNvPr id="14" name="13 CuadroTexto"/>
@@ -5718,7 +5487,7 @@
         </p:nvSpPr>
         <p:spPr>
           <a:xfrm>
-            <a:off x="4716016" y="1863870"/>
+            <a:off x="5162249" y="2151593"/>
             <a:ext cx="1770509" cy="523220"/>
           </a:xfrm>
           <a:prstGeom prst="rect">
@@ -5735,36 +5504,6 @@
             <a:r>
               <a:rPr lang="en-US" sz="1400" dirty="0" smtClean="0"/>
               <a:t>Escribe el título y el mensaje</a:t>
-            </a:r>
-            <a:endParaRPr lang="es-VE" sz="1400" dirty="0"/>
-          </a:p>
-        </p:txBody>
-      </p:sp>
-      <p:sp>
-        <p:nvSpPr>
-          <p:cNvPr id="25" name="24 CuadroTexto"/>
-          <p:cNvSpPr txBox="1"/>
-          <p:nvPr/>
-        </p:nvSpPr>
-        <p:spPr>
-          <a:xfrm>
-            <a:off x="6391943" y="5870337"/>
-            <a:ext cx="1732574" cy="523220"/>
-          </a:xfrm>
-          <a:prstGeom prst="rect">
-            <a:avLst/>
-          </a:prstGeom>
-          <a:noFill/>
-        </p:spPr>
-        <p:txBody>
-          <a:bodyPr wrap="square" rtlCol="0">
-            <a:spAutoFit/>
-          </a:bodyPr>
-          <a:lstStyle/>
-          <a:p>
-            <a:r>
-              <a:rPr lang="en-US" sz="1400" dirty="0" smtClean="0"/>
-              <a:t>Mensaje enviado satisfactoriamente</a:t>
             </a:r>
             <a:endParaRPr lang="es-VE" sz="1400" dirty="0"/>
           </a:p>
@@ -5833,6 +5572,128 @@
           </a:p>
         </p:txBody>
       </p:sp>
+      <p:pic>
+        <p:nvPicPr>
+          <p:cNvPr id="6147" name="Picture 3"/>
+          <p:cNvPicPr>
+            <a:picLocks noChangeAspect="1" noChangeArrowheads="1"/>
+          </p:cNvPicPr>
+          <p:nvPr/>
+        </p:nvPicPr>
+        <p:blipFill>
+          <a:blip r:embed="rId4">
+            <a:extLst>
+              <a:ext uri="{28A0092B-C50C-407E-A947-70E740481C1C}">
+                <a14:useLocalDpi xmlns:a14="http://schemas.microsoft.com/office/drawing/2010/main" val="0"/>
+              </a:ext>
+            </a:extLst>
+          </a:blip>
+          <a:srcRect/>
+          <a:stretch>
+            <a:fillRect/>
+          </a:stretch>
+        </p:blipFill>
+        <p:spPr bwMode="auto">
+          <a:xfrm>
+            <a:off x="2987824" y="2387090"/>
+            <a:ext cx="1627468" cy="2875867"/>
+          </a:xfrm>
+          <a:prstGeom prst="rect">
+            <a:avLst/>
+          </a:prstGeom>
+          <a:noFill/>
+          <a:ln>
+            <a:noFill/>
+          </a:ln>
+          <a:effectLst>
+            <a:outerShdw blurRad="63500" sx="102000" sy="102000" algn="ctr" rotWithShape="0">
+              <a:prstClr val="black">
+                <a:alpha val="40000"/>
+              </a:prstClr>
+            </a:outerShdw>
+          </a:effectLst>
+          <a:extLst>
+            <a:ext uri="{909E8E84-426E-40DD-AFC4-6F175D3DCCD1}">
+              <a14:hiddenFill xmlns:a14="http://schemas.microsoft.com/office/drawing/2010/main">
+                <a:solidFill>
+                  <a:schemeClr val="accent1"/>
+                </a:solidFill>
+              </a14:hiddenFill>
+            </a:ext>
+            <a:ext uri="{91240B29-F687-4F45-9708-019B960494DF}">
+              <a14:hiddenLine xmlns:a14="http://schemas.microsoft.com/office/drawing/2010/main" w="9525">
+                <a:solidFill>
+                  <a:schemeClr val="tx1"/>
+                </a:solidFill>
+                <a:miter lim="800000"/>
+                <a:headEnd/>
+                <a:tailEnd/>
+              </a14:hiddenLine>
+            </a:ext>
+          </a:extLst>
+        </p:spPr>
+      </p:pic>
+      <p:pic>
+        <p:nvPicPr>
+          <p:cNvPr id="6148" name="Picture 4"/>
+          <p:cNvPicPr>
+            <a:picLocks noChangeAspect="1" noChangeArrowheads="1"/>
+          </p:cNvPicPr>
+          <p:nvPr/>
+        </p:nvPicPr>
+        <p:blipFill>
+          <a:blip r:embed="rId5">
+            <a:extLst>
+              <a:ext uri="{28A0092B-C50C-407E-A947-70E740481C1C}">
+                <a14:useLocalDpi xmlns:a14="http://schemas.microsoft.com/office/drawing/2010/main" val="0"/>
+              </a:ext>
+            </a:extLst>
+          </a:blip>
+          <a:srcRect/>
+          <a:stretch>
+            <a:fillRect/>
+          </a:stretch>
+        </p:blipFill>
+        <p:spPr bwMode="auto">
+          <a:xfrm>
+            <a:off x="5001741" y="2967505"/>
+            <a:ext cx="1948328" cy="3453578"/>
+          </a:xfrm>
+          <a:prstGeom prst="rect">
+            <a:avLst/>
+          </a:prstGeom>
+          <a:noFill/>
+          <a:ln>
+            <a:noFill/>
+          </a:ln>
+          <a:effectLst>
+            <a:outerShdw blurRad="63500" sx="102000" sy="102000" algn="ctr" rotWithShape="0">
+              <a:prstClr val="black">
+                <a:alpha val="40000"/>
+              </a:prstClr>
+            </a:outerShdw>
+          </a:effectLst>
+          <a:extLst>
+            <a:ext uri="{909E8E84-426E-40DD-AFC4-6F175D3DCCD1}">
+              <a14:hiddenFill xmlns:a14="http://schemas.microsoft.com/office/drawing/2010/main">
+                <a:solidFill>
+                  <a:schemeClr val="accent1"/>
+                </a:solidFill>
+              </a14:hiddenFill>
+            </a:ext>
+            <a:ext uri="{91240B29-F687-4F45-9708-019B960494DF}">
+              <a14:hiddenLine xmlns:a14="http://schemas.microsoft.com/office/drawing/2010/main" w="9525">
+                <a:solidFill>
+                  <a:schemeClr val="tx1"/>
+                </a:solidFill>
+                <a:miter lim="800000"/>
+                <a:headEnd/>
+                <a:tailEnd/>
+              </a14:hiddenLine>
+            </a:ext>
+          </a:extLst>
+        </p:spPr>
+      </p:pic>
     </p:spTree>
     <p:extLst>
       <p:ext uri="{BB962C8B-B14F-4D97-AF65-F5344CB8AC3E}">
@@ -7352,6 +7213,70 @@
           <a:chExt cx="0" cy="0"/>
         </a:xfrm>
       </p:grpSpPr>
+      <p:pic>
+        <p:nvPicPr>
+          <p:cNvPr id="7170" name="Picture 2"/>
+          <p:cNvPicPr>
+            <a:picLocks noChangeAspect="1" noChangeArrowheads="1"/>
+          </p:cNvPicPr>
+          <p:nvPr/>
+        </p:nvPicPr>
+        <p:blipFill>
+          <a:blip r:embed="rId2">
+            <a:extLst>
+              <a:ext uri="{28A0092B-C50C-407E-A947-70E740481C1C}">
+                <a14:useLocalDpi xmlns:a14="http://schemas.microsoft.com/office/drawing/2010/main" val="0"/>
+              </a:ext>
+            </a:extLst>
+          </a:blip>
+          <a:srcRect/>
+          <a:stretch>
+            <a:fillRect/>
+          </a:stretch>
+        </p:blipFill>
+        <p:spPr bwMode="auto">
+          <a:xfrm>
+            <a:off x="1320563" y="2933330"/>
+            <a:ext cx="1926859" cy="3436937"/>
+          </a:xfrm>
+          <a:prstGeom prst="rect">
+            <a:avLst/>
+          </a:prstGeom>
+          <a:noFill/>
+          <a:ln>
+            <a:noFill/>
+          </a:ln>
+          <a:effectLst/>
+          <a:extLst>
+            <a:ext uri="{909E8E84-426E-40DD-AFC4-6F175D3DCCD1}">
+              <a14:hiddenFill xmlns:a14="http://schemas.microsoft.com/office/drawing/2010/main">
+                <a:solidFill>
+                  <a:schemeClr val="accent1"/>
+                </a:solidFill>
+              </a14:hiddenFill>
+            </a:ext>
+            <a:ext uri="{91240B29-F687-4F45-9708-019B960494DF}">
+              <a14:hiddenLine xmlns:a14="http://schemas.microsoft.com/office/drawing/2010/main" w="9525">
+                <a:solidFill>
+                  <a:schemeClr val="tx1"/>
+                </a:solidFill>
+                <a:miter lim="800000"/>
+                <a:headEnd/>
+                <a:tailEnd/>
+              </a14:hiddenLine>
+            </a:ext>
+            <a:ext uri="{AF507438-7753-43E0-B8FC-AC1667EBCBE1}">
+              <a14:hiddenEffects xmlns:a14="http://schemas.microsoft.com/office/drawing/2010/main">
+                <a:effectLst>
+                  <a:outerShdw dist="35921" dir="2700000" algn="ctr" rotWithShape="0">
+                    <a:schemeClr val="bg2"/>
+                  </a:outerShdw>
+                </a:effectLst>
+              </a14:hiddenEffects>
+            </a:ext>
+          </a:extLst>
+        </p:spPr>
+      </p:pic>
       <p:sp>
         <p:nvSpPr>
           <p:cNvPr id="2" name="1 Título"/>
@@ -7413,7 +7338,7 @@
           <p:nvPr/>
         </p:nvPicPr>
         <p:blipFill>
-          <a:blip r:embed="rId2">
+          <a:blip r:embed="rId3">
             <a:extLst>
               <a:ext uri="{28A0092B-C50C-407E-A947-70E740481C1C}">
                 <a14:useLocalDpi xmlns:a14="http://schemas.microsoft.com/office/drawing/2010/main" val="0"/>
@@ -7476,196 +7401,10 @@
           </a:extLst>
         </p:spPr>
       </p:pic>
-      <p:pic>
-        <p:nvPicPr>
-          <p:cNvPr id="9219" name="Picture 3"/>
-          <p:cNvPicPr>
-            <a:picLocks noChangeAspect="1" noChangeArrowheads="1"/>
-          </p:cNvPicPr>
-          <p:nvPr/>
-        </p:nvPicPr>
-        <p:blipFill>
-          <a:blip r:embed="rId3">
-            <a:extLst>
-              <a:ext uri="{28A0092B-C50C-407E-A947-70E740481C1C}">
-                <a14:useLocalDpi xmlns:a14="http://schemas.microsoft.com/office/drawing/2010/main" val="0"/>
-              </a:ext>
-            </a:extLst>
-          </a:blip>
-          <a:srcRect/>
-          <a:stretch>
-            <a:fillRect/>
-          </a:stretch>
-        </p:blipFill>
-        <p:spPr bwMode="auto">
-          <a:xfrm>
-            <a:off x="1403648" y="2933330"/>
-            <a:ext cx="1857021" cy="3312368"/>
-          </a:xfrm>
-          <a:prstGeom prst="rect">
-            <a:avLst/>
-          </a:prstGeom>
-          <a:noFill/>
-          <a:ln>
-            <a:noFill/>
-          </a:ln>
-          <a:effectLst>
-            <a:outerShdw blurRad="63500" sx="102000" sy="102000" algn="ctr" rotWithShape="0">
-              <a:prstClr val="black">
-                <a:alpha val="40000"/>
-              </a:prstClr>
-            </a:outerShdw>
-          </a:effectLst>
-          <a:extLst>
-            <a:ext uri="{909E8E84-426E-40DD-AFC4-6F175D3DCCD1}">
-              <a14:hiddenFill xmlns:a14="http://schemas.microsoft.com/office/drawing/2010/main">
-                <a:solidFill>
-                  <a:schemeClr val="accent1"/>
-                </a:solidFill>
-              </a14:hiddenFill>
-            </a:ext>
-            <a:ext uri="{91240B29-F687-4F45-9708-019B960494DF}">
-              <a14:hiddenLine xmlns:a14="http://schemas.microsoft.com/office/drawing/2010/main" w="9525">
-                <a:solidFill>
-                  <a:schemeClr val="tx1"/>
-                </a:solidFill>
-                <a:miter lim="800000"/>
-                <a:headEnd/>
-                <a:tailEnd/>
-              </a14:hiddenLine>
-            </a:ext>
-          </a:extLst>
-        </p:spPr>
-      </p:pic>
-      <p:pic>
-        <p:nvPicPr>
-          <p:cNvPr id="9220" name="Picture 4"/>
-          <p:cNvPicPr>
-            <a:picLocks noChangeAspect="1" noChangeArrowheads="1"/>
-          </p:cNvPicPr>
-          <p:nvPr/>
-        </p:nvPicPr>
-        <p:blipFill>
-          <a:blip r:embed="rId4">
-            <a:extLst>
-              <a:ext uri="{28A0092B-C50C-407E-A947-70E740481C1C}">
-                <a14:useLocalDpi xmlns:a14="http://schemas.microsoft.com/office/drawing/2010/main" val="0"/>
-              </a:ext>
-            </a:extLst>
-          </a:blip>
-          <a:srcRect/>
-          <a:stretch>
-            <a:fillRect/>
-          </a:stretch>
-        </p:blipFill>
-        <p:spPr bwMode="auto">
-          <a:xfrm>
-            <a:off x="3630787" y="2671720"/>
-            <a:ext cx="1847283" cy="3312368"/>
-          </a:xfrm>
-          <a:prstGeom prst="rect">
-            <a:avLst/>
-          </a:prstGeom>
-          <a:noFill/>
-          <a:ln>
-            <a:noFill/>
-          </a:ln>
-          <a:effectLst>
-            <a:outerShdw blurRad="63500" sx="102000" sy="102000" algn="ctr" rotWithShape="0">
-              <a:prstClr val="black">
-                <a:alpha val="40000"/>
-              </a:prstClr>
-            </a:outerShdw>
-          </a:effectLst>
-          <a:extLst>
-            <a:ext uri="{909E8E84-426E-40DD-AFC4-6F175D3DCCD1}">
-              <a14:hiddenFill xmlns:a14="http://schemas.microsoft.com/office/drawing/2010/main">
-                <a:solidFill>
-                  <a:schemeClr val="accent1"/>
-                </a:solidFill>
-              </a14:hiddenFill>
-            </a:ext>
-            <a:ext uri="{91240B29-F687-4F45-9708-019B960494DF}">
-              <a14:hiddenLine xmlns:a14="http://schemas.microsoft.com/office/drawing/2010/main" w="9525">
-                <a:solidFill>
-                  <a:schemeClr val="tx1"/>
-                </a:solidFill>
-                <a:miter lim="800000"/>
-                <a:headEnd/>
-                <a:tailEnd/>
-              </a14:hiddenLine>
-            </a:ext>
-          </a:extLst>
-        </p:spPr>
-      </p:pic>
-      <p:pic>
-        <p:nvPicPr>
-          <p:cNvPr id="9221" name="Picture 5"/>
-          <p:cNvPicPr>
-            <a:picLocks noChangeAspect="1" noChangeArrowheads="1"/>
-          </p:cNvPicPr>
-          <p:nvPr/>
-        </p:nvPicPr>
-        <p:blipFill>
-          <a:blip r:embed="rId5">
-            <a:extLst>
-              <a:ext uri="{28A0092B-C50C-407E-A947-70E740481C1C}">
-                <a14:useLocalDpi xmlns:a14="http://schemas.microsoft.com/office/drawing/2010/main" val="0"/>
-              </a:ext>
-            </a:extLst>
-          </a:blip>
-          <a:srcRect/>
-          <a:stretch>
-            <a:fillRect/>
-          </a:stretch>
-        </p:blipFill>
-        <p:spPr bwMode="auto">
-          <a:xfrm>
-            <a:off x="5868144" y="2956201"/>
-            <a:ext cx="1906634" cy="3414066"/>
-          </a:xfrm>
-          <a:prstGeom prst="rect">
-            <a:avLst/>
-          </a:prstGeom>
-          <a:noFill/>
-          <a:ln>
-            <a:noFill/>
-          </a:ln>
-          <a:effectLst>
-            <a:outerShdw blurRad="63500" sx="102000" sy="102000" algn="ctr" rotWithShape="0">
-              <a:prstClr val="black">
-                <a:alpha val="40000"/>
-              </a:prstClr>
-            </a:outerShdw>
-          </a:effectLst>
-          <a:extLst>
-            <a:ext uri="{909E8E84-426E-40DD-AFC4-6F175D3DCCD1}">
-              <a14:hiddenFill xmlns:a14="http://schemas.microsoft.com/office/drawing/2010/main">
-                <a:solidFill>
-                  <a:schemeClr val="accent1"/>
-                </a:solidFill>
-              </a14:hiddenFill>
-            </a:ext>
-            <a:ext uri="{91240B29-F687-4F45-9708-019B960494DF}">
-              <a14:hiddenLine xmlns:a14="http://schemas.microsoft.com/office/drawing/2010/main" w="9525">
-                <a:solidFill>
-                  <a:schemeClr val="tx1"/>
-                </a:solidFill>
-                <a:miter lim="800000"/>
-                <a:headEnd/>
-                <a:tailEnd/>
-              </a14:hiddenLine>
-            </a:ext>
-          </a:extLst>
-        </p:spPr>
-      </p:pic>
       <p:cxnSp>
         <p:nvCxnSpPr>
           <p:cNvPr id="6" name="5 Conector curvado"/>
-          <p:cNvCxnSpPr>
-            <a:stCxn id="9219" idx="0"/>
-            <a:endCxn id="9220" idx="0"/>
-          </p:cNvCxnSpPr>
+          <p:cNvCxnSpPr/>
           <p:nvPr/>
         </p:nvCxnSpPr>
         <p:spPr>
@@ -7700,10 +7439,7 @@
       <p:cxnSp>
         <p:nvCxnSpPr>
           <p:cNvPr id="8" name="7 Conector curvado"/>
-          <p:cNvCxnSpPr>
-            <a:stCxn id="9220" idx="0"/>
-            <a:endCxn id="9221" idx="0"/>
-          </p:cNvCxnSpPr>
+          <p:cNvCxnSpPr/>
           <p:nvPr/>
         </p:nvCxnSpPr>
         <p:spPr>
@@ -7744,7 +7480,7 @@
         <p:spPr>
           <a:xfrm>
             <a:off x="1249710" y="5733256"/>
-            <a:ext cx="1234058" cy="0"/>
+            <a:ext cx="1234058" cy="72008"/>
           </a:xfrm>
           <a:prstGeom prst="straightConnector1">
             <a:avLst/>
@@ -7892,6 +7628,128 @@
           </a:p>
         </p:txBody>
       </p:sp>
+      <p:pic>
+        <p:nvPicPr>
+          <p:cNvPr id="7171" name="Picture 3"/>
+          <p:cNvPicPr>
+            <a:picLocks noChangeAspect="1" noChangeArrowheads="1"/>
+          </p:cNvPicPr>
+          <p:nvPr/>
+        </p:nvPicPr>
+        <p:blipFill>
+          <a:blip r:embed="rId4">
+            <a:extLst>
+              <a:ext uri="{28A0092B-C50C-407E-A947-70E740481C1C}">
+                <a14:useLocalDpi xmlns:a14="http://schemas.microsoft.com/office/drawing/2010/main" val="0"/>
+              </a:ext>
+            </a:extLst>
+          </a:blip>
+          <a:srcRect/>
+          <a:stretch>
+            <a:fillRect/>
+          </a:stretch>
+        </p:blipFill>
+        <p:spPr bwMode="auto">
+          <a:xfrm>
+            <a:off x="3647130" y="2652628"/>
+            <a:ext cx="1788966" cy="3181005"/>
+          </a:xfrm>
+          <a:prstGeom prst="rect">
+            <a:avLst/>
+          </a:prstGeom>
+          <a:noFill/>
+          <a:ln>
+            <a:noFill/>
+          </a:ln>
+          <a:effectLst>
+            <a:outerShdw blurRad="63500" sx="102000" sy="102000" algn="ctr" rotWithShape="0">
+              <a:prstClr val="black">
+                <a:alpha val="40000"/>
+              </a:prstClr>
+            </a:outerShdw>
+          </a:effectLst>
+          <a:extLst>
+            <a:ext uri="{909E8E84-426E-40DD-AFC4-6F175D3DCCD1}">
+              <a14:hiddenFill xmlns:a14="http://schemas.microsoft.com/office/drawing/2010/main">
+                <a:solidFill>
+                  <a:schemeClr val="accent1"/>
+                </a:solidFill>
+              </a14:hiddenFill>
+            </a:ext>
+            <a:ext uri="{91240B29-F687-4F45-9708-019B960494DF}">
+              <a14:hiddenLine xmlns:a14="http://schemas.microsoft.com/office/drawing/2010/main" w="9525">
+                <a:solidFill>
+                  <a:schemeClr val="tx1"/>
+                </a:solidFill>
+                <a:miter lim="800000"/>
+                <a:headEnd/>
+                <a:tailEnd/>
+              </a14:hiddenLine>
+            </a:ext>
+          </a:extLst>
+        </p:spPr>
+      </p:pic>
+      <p:pic>
+        <p:nvPicPr>
+          <p:cNvPr id="7172" name="Picture 4"/>
+          <p:cNvPicPr>
+            <a:picLocks noChangeAspect="1" noChangeArrowheads="1"/>
+          </p:cNvPicPr>
+          <p:nvPr/>
+        </p:nvPicPr>
+        <p:blipFill>
+          <a:blip r:embed="rId5">
+            <a:extLst>
+              <a:ext uri="{28A0092B-C50C-407E-A947-70E740481C1C}">
+                <a14:useLocalDpi xmlns:a14="http://schemas.microsoft.com/office/drawing/2010/main" val="0"/>
+              </a:ext>
+            </a:extLst>
+          </a:blip>
+          <a:srcRect/>
+          <a:stretch>
+            <a:fillRect/>
+          </a:stretch>
+        </p:blipFill>
+        <p:spPr bwMode="auto">
+          <a:xfrm>
+            <a:off x="5909076" y="2956200"/>
+            <a:ext cx="1824770" cy="3259337"/>
+          </a:xfrm>
+          <a:prstGeom prst="rect">
+            <a:avLst/>
+          </a:prstGeom>
+          <a:noFill/>
+          <a:ln>
+            <a:noFill/>
+          </a:ln>
+          <a:effectLst>
+            <a:outerShdw blurRad="63500" sx="102000" sy="102000" algn="ctr" rotWithShape="0">
+              <a:prstClr val="black">
+                <a:alpha val="40000"/>
+              </a:prstClr>
+            </a:outerShdw>
+          </a:effectLst>
+          <a:extLst>
+            <a:ext uri="{909E8E84-426E-40DD-AFC4-6F175D3DCCD1}">
+              <a14:hiddenFill xmlns:a14="http://schemas.microsoft.com/office/drawing/2010/main">
+                <a:solidFill>
+                  <a:schemeClr val="accent1"/>
+                </a:solidFill>
+              </a14:hiddenFill>
+            </a:ext>
+            <a:ext uri="{91240B29-F687-4F45-9708-019B960494DF}">
+              <a14:hiddenLine xmlns:a14="http://schemas.microsoft.com/office/drawing/2010/main" w="9525">
+                <a:solidFill>
+                  <a:schemeClr val="tx1"/>
+                </a:solidFill>
+                <a:miter lim="800000"/>
+                <a:headEnd/>
+                <a:tailEnd/>
+              </a14:hiddenLine>
+            </a:ext>
+          </a:extLst>
+        </p:spPr>
+      </p:pic>
     </p:spTree>
     <p:extLst>
       <p:ext uri="{BB962C8B-B14F-4D97-AF65-F5344CB8AC3E}">
@@ -7941,6 +7799,67 @@
           <a:chExt cx="0" cy="0"/>
         </a:xfrm>
       </p:grpSpPr>
+      <p:pic>
+        <p:nvPicPr>
+          <p:cNvPr id="8194" name="Picture 2"/>
+          <p:cNvPicPr>
+            <a:picLocks noChangeAspect="1" noChangeArrowheads="1"/>
+          </p:cNvPicPr>
+          <p:nvPr/>
+        </p:nvPicPr>
+        <p:blipFill>
+          <a:blip r:embed="rId2">
+            <a:extLst>
+              <a:ext uri="{28A0092B-C50C-407E-A947-70E740481C1C}">
+                <a14:useLocalDpi xmlns:a14="http://schemas.microsoft.com/office/drawing/2010/main" val="0"/>
+              </a:ext>
+            </a:extLst>
+          </a:blip>
+          <a:srcRect/>
+          <a:stretch>
+            <a:fillRect/>
+          </a:stretch>
+        </p:blipFill>
+        <p:spPr bwMode="auto">
+          <a:xfrm>
+            <a:off x="1193875" y="3501009"/>
+            <a:ext cx="1649934" cy="2942986"/>
+          </a:xfrm>
+          <a:prstGeom prst="rect">
+            <a:avLst/>
+          </a:prstGeom>
+          <a:noFill/>
+          <a:ln>
+            <a:noFill/>
+          </a:ln>
+          <a:effectLst>
+            <a:outerShdw blurRad="63500" sx="102000" sy="102000" algn="ctr" rotWithShape="0">
+              <a:prstClr val="black">
+                <a:alpha val="40000"/>
+              </a:prstClr>
+            </a:outerShdw>
+          </a:effectLst>
+          <a:extLst>
+            <a:ext uri="{909E8E84-426E-40DD-AFC4-6F175D3DCCD1}">
+              <a14:hiddenFill xmlns:a14="http://schemas.microsoft.com/office/drawing/2010/main">
+                <a:solidFill>
+                  <a:schemeClr val="accent1"/>
+                </a:solidFill>
+              </a14:hiddenFill>
+            </a:ext>
+            <a:ext uri="{91240B29-F687-4F45-9708-019B960494DF}">
+              <a14:hiddenLine xmlns:a14="http://schemas.microsoft.com/office/drawing/2010/main" w="9525">
+                <a:solidFill>
+                  <a:schemeClr val="tx1"/>
+                </a:solidFill>
+                <a:miter lim="800000"/>
+                <a:headEnd/>
+                <a:tailEnd/>
+              </a14:hiddenLine>
+            </a:ext>
+          </a:extLst>
+        </p:spPr>
+      </p:pic>
       <p:sp>
         <p:nvSpPr>
           <p:cNvPr id="2" name="1 Título"/>
@@ -8003,7 +7922,7 @@
           <p:nvPr/>
         </p:nvPicPr>
         <p:blipFill>
-          <a:blip r:embed="rId2">
+          <a:blip r:embed="rId3">
             <a:extLst>
               <a:ext uri="{28A0092B-C50C-407E-A947-70E740481C1C}">
                 <a14:useLocalDpi xmlns:a14="http://schemas.microsoft.com/office/drawing/2010/main" val="0"/>
@@ -8066,67 +7985,6 @@
           </a:extLst>
         </p:spPr>
       </p:pic>
-      <p:pic>
-        <p:nvPicPr>
-          <p:cNvPr id="19459" name="Picture 3"/>
-          <p:cNvPicPr>
-            <a:picLocks noChangeAspect="1" noChangeArrowheads="1"/>
-          </p:cNvPicPr>
-          <p:nvPr/>
-        </p:nvPicPr>
-        <p:blipFill>
-          <a:blip r:embed="rId3">
-            <a:extLst>
-              <a:ext uri="{28A0092B-C50C-407E-A947-70E740481C1C}">
-                <a14:useLocalDpi xmlns:a14="http://schemas.microsoft.com/office/drawing/2010/main" val="0"/>
-              </a:ext>
-            </a:extLst>
-          </a:blip>
-          <a:srcRect/>
-          <a:stretch>
-            <a:fillRect/>
-          </a:stretch>
-        </p:blipFill>
-        <p:spPr bwMode="auto">
-          <a:xfrm>
-            <a:off x="1297410" y="3501008"/>
-            <a:ext cx="1587092" cy="2808312"/>
-          </a:xfrm>
-          <a:prstGeom prst="rect">
-            <a:avLst/>
-          </a:prstGeom>
-          <a:noFill/>
-          <a:ln>
-            <a:noFill/>
-          </a:ln>
-          <a:effectLst>
-            <a:outerShdw blurRad="63500" sx="102000" sy="102000" algn="ctr" rotWithShape="0">
-              <a:prstClr val="black">
-                <a:alpha val="40000"/>
-              </a:prstClr>
-            </a:outerShdw>
-          </a:effectLst>
-          <a:extLst>
-            <a:ext uri="{909E8E84-426E-40DD-AFC4-6F175D3DCCD1}">
-              <a14:hiddenFill xmlns:a14="http://schemas.microsoft.com/office/drawing/2010/main">
-                <a:solidFill>
-                  <a:schemeClr val="accent1"/>
-                </a:solidFill>
-              </a14:hiddenFill>
-            </a:ext>
-            <a:ext uri="{91240B29-F687-4F45-9708-019B960494DF}">
-              <a14:hiddenLine xmlns:a14="http://schemas.microsoft.com/office/drawing/2010/main" w="9525">
-                <a:solidFill>
-                  <a:schemeClr val="tx1"/>
-                </a:solidFill>
-                <a:miter lim="800000"/>
-                <a:headEnd/>
-                <a:tailEnd/>
-              </a14:hiddenLine>
-            </a:ext>
-          </a:extLst>
-        </p:spPr>
-      </p:pic>
       <p:cxnSp>
         <p:nvCxnSpPr>
           <p:cNvPr id="8" name="7 Conector recto de flecha"/>
@@ -8136,7 +7994,7 @@
         <p:spPr>
           <a:xfrm>
             <a:off x="971600" y="5085184"/>
-            <a:ext cx="1368152" cy="720080"/>
+            <a:ext cx="1296144" cy="792088"/>
           </a:xfrm>
           <a:prstGeom prst="straightConnector1">
             <a:avLst/>
@@ -8190,196 +8048,10 @@
           </a:p>
         </p:txBody>
       </p:sp>
-      <p:pic>
-        <p:nvPicPr>
-          <p:cNvPr id="19460" name="Picture 4"/>
-          <p:cNvPicPr>
-            <a:picLocks noChangeAspect="1" noChangeArrowheads="1"/>
-          </p:cNvPicPr>
-          <p:nvPr/>
-        </p:nvPicPr>
-        <p:blipFill>
-          <a:blip r:embed="rId4">
-            <a:extLst>
-              <a:ext uri="{28A0092B-C50C-407E-A947-70E740481C1C}">
-                <a14:useLocalDpi xmlns:a14="http://schemas.microsoft.com/office/drawing/2010/main" val="0"/>
-              </a:ext>
-            </a:extLst>
-          </a:blip>
-          <a:srcRect/>
-          <a:stretch>
-            <a:fillRect/>
-          </a:stretch>
-        </p:blipFill>
-        <p:spPr bwMode="auto">
-          <a:xfrm>
-            <a:off x="2966162" y="3084936"/>
-            <a:ext cx="1707089" cy="3050283"/>
-          </a:xfrm>
-          <a:prstGeom prst="rect">
-            <a:avLst/>
-          </a:prstGeom>
-          <a:noFill/>
-          <a:ln>
-            <a:noFill/>
-          </a:ln>
-          <a:effectLst>
-            <a:outerShdw blurRad="63500" sx="102000" sy="102000" algn="ctr" rotWithShape="0">
-              <a:prstClr val="black">
-                <a:alpha val="40000"/>
-              </a:prstClr>
-            </a:outerShdw>
-          </a:effectLst>
-          <a:extLst>
-            <a:ext uri="{909E8E84-426E-40DD-AFC4-6F175D3DCCD1}">
-              <a14:hiddenFill xmlns:a14="http://schemas.microsoft.com/office/drawing/2010/main">
-                <a:solidFill>
-                  <a:schemeClr val="accent1"/>
-                </a:solidFill>
-              </a14:hiddenFill>
-            </a:ext>
-            <a:ext uri="{91240B29-F687-4F45-9708-019B960494DF}">
-              <a14:hiddenLine xmlns:a14="http://schemas.microsoft.com/office/drawing/2010/main" w="9525">
-                <a:solidFill>
-                  <a:schemeClr val="tx1"/>
-                </a:solidFill>
-                <a:miter lim="800000"/>
-                <a:headEnd/>
-                <a:tailEnd/>
-              </a14:hiddenLine>
-            </a:ext>
-          </a:extLst>
-        </p:spPr>
-      </p:pic>
-      <p:pic>
-        <p:nvPicPr>
-          <p:cNvPr id="19461" name="Picture 5"/>
-          <p:cNvPicPr>
-            <a:picLocks noChangeAspect="1" noChangeArrowheads="1"/>
-          </p:cNvPicPr>
-          <p:nvPr/>
-        </p:nvPicPr>
-        <p:blipFill>
-          <a:blip r:embed="rId5">
-            <a:extLst>
-              <a:ext uri="{28A0092B-C50C-407E-A947-70E740481C1C}">
-                <a14:useLocalDpi xmlns:a14="http://schemas.microsoft.com/office/drawing/2010/main" val="0"/>
-              </a:ext>
-            </a:extLst>
-          </a:blip>
-          <a:srcRect/>
-          <a:stretch>
-            <a:fillRect/>
-          </a:stretch>
-        </p:blipFill>
-        <p:spPr bwMode="auto">
-          <a:xfrm>
-            <a:off x="4859635" y="3472805"/>
-            <a:ext cx="1580848" cy="2792338"/>
-          </a:xfrm>
-          <a:prstGeom prst="rect">
-            <a:avLst/>
-          </a:prstGeom>
-          <a:noFill/>
-          <a:ln>
-            <a:noFill/>
-          </a:ln>
-          <a:effectLst>
-            <a:outerShdw blurRad="63500" sx="102000" sy="102000" algn="ctr" rotWithShape="0">
-              <a:prstClr val="black">
-                <a:alpha val="40000"/>
-              </a:prstClr>
-            </a:outerShdw>
-          </a:effectLst>
-          <a:extLst>
-            <a:ext uri="{909E8E84-426E-40DD-AFC4-6F175D3DCCD1}">
-              <a14:hiddenFill xmlns:a14="http://schemas.microsoft.com/office/drawing/2010/main">
-                <a:solidFill>
-                  <a:schemeClr val="accent1"/>
-                </a:solidFill>
-              </a14:hiddenFill>
-            </a:ext>
-            <a:ext uri="{91240B29-F687-4F45-9708-019B960494DF}">
-              <a14:hiddenLine xmlns:a14="http://schemas.microsoft.com/office/drawing/2010/main" w="9525">
-                <a:solidFill>
-                  <a:schemeClr val="tx1"/>
-                </a:solidFill>
-                <a:miter lim="800000"/>
-                <a:headEnd/>
-                <a:tailEnd/>
-              </a14:hiddenLine>
-            </a:ext>
-          </a:extLst>
-        </p:spPr>
-      </p:pic>
-      <p:pic>
-        <p:nvPicPr>
-          <p:cNvPr id="19462" name="Picture 6"/>
-          <p:cNvPicPr>
-            <a:picLocks noChangeAspect="1" noChangeArrowheads="1"/>
-          </p:cNvPicPr>
-          <p:nvPr/>
-        </p:nvPicPr>
-        <p:blipFill>
-          <a:blip r:embed="rId6">
-            <a:extLst>
-              <a:ext uri="{28A0092B-C50C-407E-A947-70E740481C1C}">
-                <a14:useLocalDpi xmlns:a14="http://schemas.microsoft.com/office/drawing/2010/main" val="0"/>
-              </a:ext>
-            </a:extLst>
-          </a:blip>
-          <a:srcRect/>
-          <a:stretch>
-            <a:fillRect/>
-          </a:stretch>
-        </p:blipFill>
-        <p:spPr bwMode="auto">
-          <a:xfrm>
-            <a:off x="6529752" y="3084936"/>
-            <a:ext cx="1668197" cy="2970331"/>
-          </a:xfrm>
-          <a:prstGeom prst="rect">
-            <a:avLst/>
-          </a:prstGeom>
-          <a:noFill/>
-          <a:ln>
-            <a:noFill/>
-          </a:ln>
-          <a:effectLst>
-            <a:outerShdw blurRad="63500" sx="102000" sy="102000" algn="ctr" rotWithShape="0">
-              <a:prstClr val="black">
-                <a:alpha val="40000"/>
-              </a:prstClr>
-            </a:outerShdw>
-          </a:effectLst>
-          <a:extLst>
-            <a:ext uri="{909E8E84-426E-40DD-AFC4-6F175D3DCCD1}">
-              <a14:hiddenFill xmlns:a14="http://schemas.microsoft.com/office/drawing/2010/main">
-                <a:solidFill>
-                  <a:schemeClr val="accent1"/>
-                </a:solidFill>
-              </a14:hiddenFill>
-            </a:ext>
-            <a:ext uri="{91240B29-F687-4F45-9708-019B960494DF}">
-              <a14:hiddenLine xmlns:a14="http://schemas.microsoft.com/office/drawing/2010/main" w="9525">
-                <a:solidFill>
-                  <a:schemeClr val="tx1"/>
-                </a:solidFill>
-                <a:miter lim="800000"/>
-                <a:headEnd/>
-                <a:tailEnd/>
-              </a14:hiddenLine>
-            </a:ext>
-          </a:extLst>
-        </p:spPr>
-      </p:pic>
       <p:cxnSp>
         <p:nvCxnSpPr>
           <p:cNvPr id="17" name="16 Conector curvado"/>
-          <p:cNvCxnSpPr>
-            <a:stCxn id="19459" idx="0"/>
-            <a:endCxn id="19460" idx="0"/>
-          </p:cNvCxnSpPr>
+          <p:cNvCxnSpPr/>
           <p:nvPr/>
         </p:nvCxnSpPr>
         <p:spPr>
@@ -8414,10 +8086,7 @@
       <p:cxnSp>
         <p:nvCxnSpPr>
           <p:cNvPr id="20" name="19 Conector curvado"/>
-          <p:cNvCxnSpPr>
-            <a:stCxn id="19460" idx="0"/>
-            <a:endCxn id="19461" idx="0"/>
-          </p:cNvCxnSpPr>
+          <p:cNvCxnSpPr/>
           <p:nvPr/>
         </p:nvCxnSpPr>
         <p:spPr>
@@ -8452,10 +8121,7 @@
       <p:cxnSp>
         <p:nvCxnSpPr>
           <p:cNvPr id="23" name="22 Conector curvado"/>
-          <p:cNvCxnSpPr>
-            <a:stCxn id="19461" idx="0"/>
-            <a:endCxn id="19462" idx="0"/>
-          </p:cNvCxnSpPr>
+          <p:cNvCxnSpPr/>
           <p:nvPr/>
         </p:nvCxnSpPr>
         <p:spPr>
@@ -8608,6 +8274,192 @@
           </a:p>
         </p:txBody>
       </p:sp>
+      <p:pic>
+        <p:nvPicPr>
+          <p:cNvPr id="8195" name="Picture 3"/>
+          <p:cNvPicPr>
+            <a:picLocks noChangeAspect="1" noChangeArrowheads="1"/>
+          </p:cNvPicPr>
+          <p:nvPr/>
+        </p:nvPicPr>
+        <p:blipFill>
+          <a:blip r:embed="rId4">
+            <a:extLst>
+              <a:ext uri="{28A0092B-C50C-407E-A947-70E740481C1C}">
+                <a14:useLocalDpi xmlns:a14="http://schemas.microsoft.com/office/drawing/2010/main" val="0"/>
+              </a:ext>
+            </a:extLst>
+          </a:blip>
+          <a:srcRect/>
+          <a:stretch>
+            <a:fillRect/>
+          </a:stretch>
+        </p:blipFill>
+        <p:spPr bwMode="auto">
+          <a:xfrm>
+            <a:off x="2980111" y="3084936"/>
+            <a:ext cx="1687569" cy="2970331"/>
+          </a:xfrm>
+          <a:prstGeom prst="rect">
+            <a:avLst/>
+          </a:prstGeom>
+          <a:noFill/>
+          <a:ln>
+            <a:noFill/>
+          </a:ln>
+          <a:effectLst>
+            <a:outerShdw blurRad="63500" sx="102000" sy="102000" algn="ctr" rotWithShape="0">
+              <a:prstClr val="black">
+                <a:alpha val="40000"/>
+              </a:prstClr>
+            </a:outerShdw>
+          </a:effectLst>
+          <a:extLst>
+            <a:ext uri="{909E8E84-426E-40DD-AFC4-6F175D3DCCD1}">
+              <a14:hiddenFill xmlns:a14="http://schemas.microsoft.com/office/drawing/2010/main">
+                <a:solidFill>
+                  <a:schemeClr val="accent1"/>
+                </a:solidFill>
+              </a14:hiddenFill>
+            </a:ext>
+            <a:ext uri="{91240B29-F687-4F45-9708-019B960494DF}">
+              <a14:hiddenLine xmlns:a14="http://schemas.microsoft.com/office/drawing/2010/main" w="9525">
+                <a:solidFill>
+                  <a:schemeClr val="tx1"/>
+                </a:solidFill>
+                <a:miter lim="800000"/>
+                <a:headEnd/>
+                <a:tailEnd/>
+              </a14:hiddenLine>
+            </a:ext>
+          </a:extLst>
+        </p:spPr>
+      </p:pic>
+      <p:pic>
+        <p:nvPicPr>
+          <p:cNvPr id="8196" name="Picture 4"/>
+          <p:cNvPicPr>
+            <a:picLocks noChangeAspect="1" noChangeArrowheads="1"/>
+          </p:cNvPicPr>
+          <p:nvPr/>
+        </p:nvPicPr>
+        <p:blipFill>
+          <a:blip r:embed="rId5">
+            <a:extLst>
+              <a:ext uri="{28A0092B-C50C-407E-A947-70E740481C1C}">
+                <a14:useLocalDpi xmlns:a14="http://schemas.microsoft.com/office/drawing/2010/main" val="0"/>
+              </a:ext>
+            </a:extLst>
+          </a:blip>
+          <a:srcRect/>
+          <a:stretch>
+            <a:fillRect/>
+          </a:stretch>
+        </p:blipFill>
+        <p:spPr bwMode="auto">
+          <a:xfrm>
+            <a:off x="4762291" y="3472806"/>
+            <a:ext cx="1644383" cy="2909687"/>
+          </a:xfrm>
+          <a:prstGeom prst="rect">
+            <a:avLst/>
+          </a:prstGeom>
+          <a:noFill/>
+          <a:ln>
+            <a:noFill/>
+          </a:ln>
+          <a:effectLst/>
+          <a:extLst>
+            <a:ext uri="{909E8E84-426E-40DD-AFC4-6F175D3DCCD1}">
+              <a14:hiddenFill xmlns:a14="http://schemas.microsoft.com/office/drawing/2010/main">
+                <a:solidFill>
+                  <a:schemeClr val="accent1"/>
+                </a:solidFill>
+              </a14:hiddenFill>
+            </a:ext>
+            <a:ext uri="{91240B29-F687-4F45-9708-019B960494DF}">
+              <a14:hiddenLine xmlns:a14="http://schemas.microsoft.com/office/drawing/2010/main" w="9525">
+                <a:solidFill>
+                  <a:schemeClr val="tx1"/>
+                </a:solidFill>
+                <a:miter lim="800000"/>
+                <a:headEnd/>
+                <a:tailEnd/>
+              </a14:hiddenLine>
+            </a:ext>
+            <a:ext uri="{AF507438-7753-43E0-B8FC-AC1667EBCBE1}">
+              <a14:hiddenEffects xmlns:a14="http://schemas.microsoft.com/office/drawing/2010/main">
+                <a:effectLst>
+                  <a:outerShdw dist="35921" dir="2700000" algn="ctr" rotWithShape="0">
+                    <a:schemeClr val="bg2"/>
+                  </a:outerShdw>
+                </a:effectLst>
+              </a14:hiddenEffects>
+            </a:ext>
+          </a:extLst>
+        </p:spPr>
+      </p:pic>
+      <p:pic>
+        <p:nvPicPr>
+          <p:cNvPr id="8197" name="Picture 5"/>
+          <p:cNvPicPr>
+            <a:picLocks noChangeAspect="1" noChangeArrowheads="1"/>
+          </p:cNvPicPr>
+          <p:nvPr/>
+        </p:nvPicPr>
+        <p:blipFill>
+          <a:blip r:embed="rId6">
+            <a:extLst>
+              <a:ext uri="{28A0092B-C50C-407E-A947-70E740481C1C}">
+                <a14:useLocalDpi xmlns:a14="http://schemas.microsoft.com/office/drawing/2010/main" val="0"/>
+              </a:ext>
+            </a:extLst>
+          </a:blip>
+          <a:srcRect/>
+          <a:stretch>
+            <a:fillRect/>
+          </a:stretch>
+        </p:blipFill>
+        <p:spPr bwMode="auto">
+          <a:xfrm>
+            <a:off x="6564560" y="3084935"/>
+            <a:ext cx="1559261" cy="2813556"/>
+          </a:xfrm>
+          <a:prstGeom prst="rect">
+            <a:avLst/>
+          </a:prstGeom>
+          <a:noFill/>
+          <a:ln>
+            <a:noFill/>
+          </a:ln>
+          <a:effectLst>
+            <a:outerShdw blurRad="63500" sx="102000" sy="102000" algn="ctr" rotWithShape="0">
+              <a:prstClr val="black">
+                <a:alpha val="40000"/>
+              </a:prstClr>
+            </a:outerShdw>
+          </a:effectLst>
+          <a:extLst>
+            <a:ext uri="{909E8E84-426E-40DD-AFC4-6F175D3DCCD1}">
+              <a14:hiddenFill xmlns:a14="http://schemas.microsoft.com/office/drawing/2010/main">
+                <a:solidFill>
+                  <a:schemeClr val="accent1"/>
+                </a:solidFill>
+              </a14:hiddenFill>
+            </a:ext>
+            <a:ext uri="{91240B29-F687-4F45-9708-019B960494DF}">
+              <a14:hiddenLine xmlns:a14="http://schemas.microsoft.com/office/drawing/2010/main" w="9525">
+                <a:solidFill>
+                  <a:schemeClr val="tx1"/>
+                </a:solidFill>
+                <a:miter lim="800000"/>
+                <a:headEnd/>
+                <a:tailEnd/>
+              </a14:hiddenLine>
+            </a:ext>
+          </a:extLst>
+        </p:spPr>
+      </p:pic>
     </p:spTree>
     <p:extLst>
       <p:ext uri="{BB962C8B-B14F-4D97-AF65-F5344CB8AC3E}">
@@ -8657,6 +8509,128 @@
           <a:chExt cx="0" cy="0"/>
         </a:xfrm>
       </p:grpSpPr>
+      <p:pic>
+        <p:nvPicPr>
+          <p:cNvPr id="9221" name="Picture 5"/>
+          <p:cNvPicPr>
+            <a:picLocks noChangeAspect="1" noChangeArrowheads="1"/>
+          </p:cNvPicPr>
+          <p:nvPr/>
+        </p:nvPicPr>
+        <p:blipFill>
+          <a:blip r:embed="rId2">
+            <a:extLst>
+              <a:ext uri="{28A0092B-C50C-407E-A947-70E740481C1C}">
+                <a14:useLocalDpi xmlns:a14="http://schemas.microsoft.com/office/drawing/2010/main" val="0"/>
+              </a:ext>
+            </a:extLst>
+          </a:blip>
+          <a:srcRect/>
+          <a:stretch>
+            <a:fillRect/>
+          </a:stretch>
+        </p:blipFill>
+        <p:spPr bwMode="auto">
+          <a:xfrm>
+            <a:off x="6406100" y="2939430"/>
+            <a:ext cx="1622283" cy="2875636"/>
+          </a:xfrm>
+          <a:prstGeom prst="rect">
+            <a:avLst/>
+          </a:prstGeom>
+          <a:noFill/>
+          <a:ln>
+            <a:noFill/>
+          </a:ln>
+          <a:effectLst>
+            <a:outerShdw blurRad="63500" sx="102000" sy="102000" algn="ctr" rotWithShape="0">
+              <a:prstClr val="black">
+                <a:alpha val="40000"/>
+              </a:prstClr>
+            </a:outerShdw>
+          </a:effectLst>
+          <a:extLst>
+            <a:ext uri="{909E8E84-426E-40DD-AFC4-6F175D3DCCD1}">
+              <a14:hiddenFill xmlns:a14="http://schemas.microsoft.com/office/drawing/2010/main">
+                <a:solidFill>
+                  <a:schemeClr val="accent1"/>
+                </a:solidFill>
+              </a14:hiddenFill>
+            </a:ext>
+            <a:ext uri="{91240B29-F687-4F45-9708-019B960494DF}">
+              <a14:hiddenLine xmlns:a14="http://schemas.microsoft.com/office/drawing/2010/main" w="9525">
+                <a:solidFill>
+                  <a:schemeClr val="tx1"/>
+                </a:solidFill>
+                <a:miter lim="800000"/>
+                <a:headEnd/>
+                <a:tailEnd/>
+              </a14:hiddenLine>
+            </a:ext>
+          </a:extLst>
+        </p:spPr>
+      </p:pic>
+      <p:pic>
+        <p:nvPicPr>
+          <p:cNvPr id="9218" name="Picture 2"/>
+          <p:cNvPicPr>
+            <a:picLocks noChangeAspect="1" noChangeArrowheads="1"/>
+          </p:cNvPicPr>
+          <p:nvPr/>
+        </p:nvPicPr>
+        <p:blipFill>
+          <a:blip r:embed="rId3">
+            <a:extLst>
+              <a:ext uri="{28A0092B-C50C-407E-A947-70E740481C1C}">
+                <a14:useLocalDpi xmlns:a14="http://schemas.microsoft.com/office/drawing/2010/main" val="0"/>
+              </a:ext>
+            </a:extLst>
+          </a:blip>
+          <a:srcRect/>
+          <a:stretch>
+            <a:fillRect/>
+          </a:stretch>
+        </p:blipFill>
+        <p:spPr bwMode="auto">
+          <a:xfrm>
+            <a:off x="1225941" y="3501009"/>
+            <a:ext cx="1642024" cy="2923729"/>
+          </a:xfrm>
+          <a:prstGeom prst="rect">
+            <a:avLst/>
+          </a:prstGeom>
+          <a:noFill/>
+          <a:ln>
+            <a:noFill/>
+          </a:ln>
+          <a:effectLst>
+            <a:outerShdw blurRad="63500" sx="102000" sy="102000" algn="ctr" rotWithShape="0">
+              <a:prstClr val="black">
+                <a:alpha val="40000"/>
+              </a:prstClr>
+            </a:outerShdw>
+          </a:effectLst>
+          <a:extLst>
+            <a:ext uri="{909E8E84-426E-40DD-AFC4-6F175D3DCCD1}">
+              <a14:hiddenFill xmlns:a14="http://schemas.microsoft.com/office/drawing/2010/main">
+                <a:solidFill>
+                  <a:schemeClr val="accent1"/>
+                </a:solidFill>
+              </a14:hiddenFill>
+            </a:ext>
+            <a:ext uri="{91240B29-F687-4F45-9708-019B960494DF}">
+              <a14:hiddenLine xmlns:a14="http://schemas.microsoft.com/office/drawing/2010/main" w="9525">
+                <a:solidFill>
+                  <a:schemeClr val="tx1"/>
+                </a:solidFill>
+                <a:miter lim="800000"/>
+                <a:headEnd/>
+                <a:tailEnd/>
+              </a14:hiddenLine>
+            </a:ext>
+          </a:extLst>
+        </p:spPr>
+      </p:pic>
       <p:sp>
         <p:nvSpPr>
           <p:cNvPr id="2" name="1 Título"/>
@@ -8720,7 +8694,7 @@
           <p:nvPr/>
         </p:nvPicPr>
         <p:blipFill>
-          <a:blip r:embed="rId2">
+          <a:blip r:embed="rId4">
             <a:extLst>
               <a:ext uri="{28A0092B-C50C-407E-A947-70E740481C1C}">
                 <a14:useLocalDpi xmlns:a14="http://schemas.microsoft.com/office/drawing/2010/main" val="0"/>
@@ -8783,67 +8757,6 @@
           </a:extLst>
         </p:spPr>
       </p:pic>
-      <p:pic>
-        <p:nvPicPr>
-          <p:cNvPr id="6" name="Picture 3"/>
-          <p:cNvPicPr>
-            <a:picLocks noChangeAspect="1" noChangeArrowheads="1"/>
-          </p:cNvPicPr>
-          <p:nvPr/>
-        </p:nvPicPr>
-        <p:blipFill>
-          <a:blip r:embed="rId3">
-            <a:extLst>
-              <a:ext uri="{28A0092B-C50C-407E-A947-70E740481C1C}">
-                <a14:useLocalDpi xmlns:a14="http://schemas.microsoft.com/office/drawing/2010/main" val="0"/>
-              </a:ext>
-            </a:extLst>
-          </a:blip>
-          <a:srcRect/>
-          <a:stretch>
-            <a:fillRect/>
-          </a:stretch>
-        </p:blipFill>
-        <p:spPr bwMode="auto">
-          <a:xfrm>
-            <a:off x="1297410" y="3501008"/>
-            <a:ext cx="1587092" cy="2808312"/>
-          </a:xfrm>
-          <a:prstGeom prst="rect">
-            <a:avLst/>
-          </a:prstGeom>
-          <a:noFill/>
-          <a:ln>
-            <a:noFill/>
-          </a:ln>
-          <a:effectLst>
-            <a:outerShdw blurRad="63500" sx="102000" sy="102000" algn="ctr" rotWithShape="0">
-              <a:prstClr val="black">
-                <a:alpha val="40000"/>
-              </a:prstClr>
-            </a:outerShdw>
-          </a:effectLst>
-          <a:extLst>
-            <a:ext uri="{909E8E84-426E-40DD-AFC4-6F175D3DCCD1}">
-              <a14:hiddenFill xmlns:a14="http://schemas.microsoft.com/office/drawing/2010/main">
-                <a:solidFill>
-                  <a:schemeClr val="accent1"/>
-                </a:solidFill>
-              </a14:hiddenFill>
-            </a:ext>
-            <a:ext uri="{91240B29-F687-4F45-9708-019B960494DF}">
-              <a14:hiddenLine xmlns:a14="http://schemas.microsoft.com/office/drawing/2010/main" w="9525">
-                <a:solidFill>
-                  <a:schemeClr val="tx1"/>
-                </a:solidFill>
-                <a:miter lim="800000"/>
-                <a:headEnd/>
-                <a:tailEnd/>
-              </a14:hiddenLine>
-            </a:ext>
-          </a:extLst>
-        </p:spPr>
-      </p:pic>
       <p:cxnSp>
         <p:nvCxnSpPr>
           <p:cNvPr id="7" name="6 Conector recto de flecha"/>
@@ -8853,7 +8766,7 @@
         <p:spPr>
           <a:xfrm>
             <a:off x="971600" y="5390639"/>
-            <a:ext cx="1119356" cy="414625"/>
+            <a:ext cx="1075353" cy="475997"/>
           </a:xfrm>
           <a:prstGeom prst="straightConnector1">
             <a:avLst/>
@@ -8907,196 +8820,10 @@
           </a:p>
         </p:txBody>
       </p:sp>
-      <p:pic>
-        <p:nvPicPr>
-          <p:cNvPr id="20482" name="Picture 2"/>
-          <p:cNvPicPr>
-            <a:picLocks noChangeAspect="1" noChangeArrowheads="1"/>
-          </p:cNvPicPr>
-          <p:nvPr/>
-        </p:nvPicPr>
-        <p:blipFill>
-          <a:blip r:embed="rId4">
-            <a:extLst>
-              <a:ext uri="{28A0092B-C50C-407E-A947-70E740481C1C}">
-                <a14:useLocalDpi xmlns:a14="http://schemas.microsoft.com/office/drawing/2010/main" val="0"/>
-              </a:ext>
-            </a:extLst>
-          </a:blip>
-          <a:srcRect/>
-          <a:stretch>
-            <a:fillRect/>
-          </a:stretch>
-        </p:blipFill>
-        <p:spPr bwMode="auto">
-          <a:xfrm>
-            <a:off x="3013847" y="2924944"/>
-            <a:ext cx="1571085" cy="2808313"/>
-          </a:xfrm>
-          <a:prstGeom prst="rect">
-            <a:avLst/>
-          </a:prstGeom>
-          <a:noFill/>
-          <a:ln>
-            <a:noFill/>
-          </a:ln>
-          <a:effectLst>
-            <a:outerShdw blurRad="63500" sx="102000" sy="102000" algn="ctr" rotWithShape="0">
-              <a:prstClr val="black">
-                <a:alpha val="40000"/>
-              </a:prstClr>
-            </a:outerShdw>
-          </a:effectLst>
-          <a:extLst>
-            <a:ext uri="{909E8E84-426E-40DD-AFC4-6F175D3DCCD1}">
-              <a14:hiddenFill xmlns:a14="http://schemas.microsoft.com/office/drawing/2010/main">
-                <a:solidFill>
-                  <a:schemeClr val="accent1"/>
-                </a:solidFill>
-              </a14:hiddenFill>
-            </a:ext>
-            <a:ext uri="{91240B29-F687-4F45-9708-019B960494DF}">
-              <a14:hiddenLine xmlns:a14="http://schemas.microsoft.com/office/drawing/2010/main" w="9525">
-                <a:solidFill>
-                  <a:schemeClr val="tx1"/>
-                </a:solidFill>
-                <a:miter lim="800000"/>
-                <a:headEnd/>
-                <a:tailEnd/>
-              </a14:hiddenLine>
-            </a:ext>
-          </a:extLst>
-        </p:spPr>
-      </p:pic>
-      <p:pic>
-        <p:nvPicPr>
-          <p:cNvPr id="20483" name="Picture 3"/>
-          <p:cNvPicPr>
-            <a:picLocks noChangeAspect="1" noChangeArrowheads="1"/>
-          </p:cNvPicPr>
-          <p:nvPr/>
-        </p:nvPicPr>
-        <p:blipFill>
-          <a:blip r:embed="rId5">
-            <a:extLst>
-              <a:ext uri="{28A0092B-C50C-407E-A947-70E740481C1C}">
-                <a14:useLocalDpi xmlns:a14="http://schemas.microsoft.com/office/drawing/2010/main" val="0"/>
-              </a:ext>
-            </a:extLst>
-          </a:blip>
-          <a:srcRect/>
-          <a:stretch>
-            <a:fillRect/>
-          </a:stretch>
-        </p:blipFill>
-        <p:spPr bwMode="auto">
-          <a:xfrm>
-            <a:off x="4689326" y="3501007"/>
-            <a:ext cx="1568917" cy="2808313"/>
-          </a:xfrm>
-          <a:prstGeom prst="rect">
-            <a:avLst/>
-          </a:prstGeom>
-          <a:noFill/>
-          <a:ln>
-            <a:noFill/>
-          </a:ln>
-          <a:effectLst>
-            <a:outerShdw blurRad="63500" sx="102000" sy="102000" algn="ctr" rotWithShape="0">
-              <a:prstClr val="black">
-                <a:alpha val="40000"/>
-              </a:prstClr>
-            </a:outerShdw>
-          </a:effectLst>
-          <a:extLst>
-            <a:ext uri="{909E8E84-426E-40DD-AFC4-6F175D3DCCD1}">
-              <a14:hiddenFill xmlns:a14="http://schemas.microsoft.com/office/drawing/2010/main">
-                <a:solidFill>
-                  <a:schemeClr val="accent1"/>
-                </a:solidFill>
-              </a14:hiddenFill>
-            </a:ext>
-            <a:ext uri="{91240B29-F687-4F45-9708-019B960494DF}">
-              <a14:hiddenLine xmlns:a14="http://schemas.microsoft.com/office/drawing/2010/main" w="9525">
-                <a:solidFill>
-                  <a:schemeClr val="tx1"/>
-                </a:solidFill>
-                <a:miter lim="800000"/>
-                <a:headEnd/>
-                <a:tailEnd/>
-              </a14:hiddenLine>
-            </a:ext>
-          </a:extLst>
-        </p:spPr>
-      </p:pic>
-      <p:pic>
-        <p:nvPicPr>
-          <p:cNvPr id="20484" name="Picture 4"/>
-          <p:cNvPicPr>
-            <a:picLocks noChangeAspect="1" noChangeArrowheads="1"/>
-          </p:cNvPicPr>
-          <p:nvPr/>
-        </p:nvPicPr>
-        <p:blipFill>
-          <a:blip r:embed="rId6">
-            <a:extLst>
-              <a:ext uri="{28A0092B-C50C-407E-A947-70E740481C1C}">
-                <a14:useLocalDpi xmlns:a14="http://schemas.microsoft.com/office/drawing/2010/main" val="0"/>
-              </a:ext>
-            </a:extLst>
-          </a:blip>
-          <a:srcRect/>
-          <a:stretch>
-            <a:fillRect/>
-          </a:stretch>
-        </p:blipFill>
-        <p:spPr bwMode="auto">
-          <a:xfrm>
-            <a:off x="6372200" y="2924944"/>
-            <a:ext cx="1596564" cy="2816299"/>
-          </a:xfrm>
-          <a:prstGeom prst="rect">
-            <a:avLst/>
-          </a:prstGeom>
-          <a:noFill/>
-          <a:ln>
-            <a:noFill/>
-          </a:ln>
-          <a:effectLst>
-            <a:outerShdw blurRad="63500" sx="102000" sy="102000" algn="ctr" rotWithShape="0">
-              <a:prstClr val="black">
-                <a:alpha val="40000"/>
-              </a:prstClr>
-            </a:outerShdw>
-          </a:effectLst>
-          <a:extLst>
-            <a:ext uri="{909E8E84-426E-40DD-AFC4-6F175D3DCCD1}">
-              <a14:hiddenFill xmlns:a14="http://schemas.microsoft.com/office/drawing/2010/main">
-                <a:solidFill>
-                  <a:schemeClr val="accent1"/>
-                </a:solidFill>
-              </a14:hiddenFill>
-            </a:ext>
-            <a:ext uri="{91240B29-F687-4F45-9708-019B960494DF}">
-              <a14:hiddenLine xmlns:a14="http://schemas.microsoft.com/office/drawing/2010/main" w="9525">
-                <a:solidFill>
-                  <a:schemeClr val="tx1"/>
-                </a:solidFill>
-                <a:miter lim="800000"/>
-                <a:headEnd/>
-                <a:tailEnd/>
-              </a14:hiddenLine>
-            </a:ext>
-          </a:extLst>
-        </p:spPr>
-      </p:pic>
       <p:cxnSp>
         <p:nvCxnSpPr>
           <p:cNvPr id="13" name="12 Conector curvado"/>
-          <p:cNvCxnSpPr>
-            <a:stCxn id="6" idx="0"/>
-            <a:endCxn id="20482" idx="0"/>
-          </p:cNvCxnSpPr>
+          <p:cNvCxnSpPr/>
           <p:nvPr/>
         </p:nvCxnSpPr>
         <p:spPr>
@@ -9131,10 +8858,7 @@
       <p:cxnSp>
         <p:nvCxnSpPr>
           <p:cNvPr id="16" name="15 Conector curvado"/>
-          <p:cNvCxnSpPr>
-            <a:stCxn id="20482" idx="0"/>
-            <a:endCxn id="20483" idx="0"/>
-          </p:cNvCxnSpPr>
+          <p:cNvCxnSpPr/>
           <p:nvPr/>
         </p:nvCxnSpPr>
         <p:spPr>
@@ -9169,15 +8893,12 @@
       <p:cxnSp>
         <p:nvCxnSpPr>
           <p:cNvPr id="19" name="18 Conector curvado"/>
-          <p:cNvCxnSpPr>
-            <a:stCxn id="20483" idx="0"/>
-            <a:endCxn id="20484" idx="0"/>
-          </p:cNvCxnSpPr>
+          <p:cNvCxnSpPr/>
           <p:nvPr/>
         </p:nvCxnSpPr>
         <p:spPr>
           <a:xfrm rot="5400000" flipH="1" flipV="1">
-            <a:off x="6034102" y="2364628"/>
+            <a:off x="5984035" y="2396564"/>
             <a:ext cx="576063" cy="1696697"/>
           </a:xfrm>
           <a:prstGeom prst="curvedConnector3">
@@ -9359,13 +9080,14 @@
           <p:cNvPr id="27" name="26 Conector recto de flecha"/>
           <p:cNvCxnSpPr>
             <a:stCxn id="26" idx="0"/>
+            <a:endCxn id="9221" idx="2"/>
           </p:cNvCxnSpPr>
           <p:nvPr/>
         </p:nvCxnSpPr>
         <p:spPr>
           <a:xfrm flipH="1" flipV="1">
-            <a:off x="7170482" y="5597951"/>
-            <a:ext cx="282453" cy="537370"/>
+            <a:off x="7217242" y="5815066"/>
+            <a:ext cx="235693" cy="320255"/>
           </a:xfrm>
           <a:prstGeom prst="straightConnector1">
             <a:avLst/>
@@ -9389,88 +9111,132 @@
           </a:fontRef>
         </p:style>
       </p:cxnSp>
+      <p:pic>
+        <p:nvPicPr>
+          <p:cNvPr id="9219" name="Picture 3"/>
+          <p:cNvPicPr>
+            <a:picLocks noChangeAspect="1" noChangeArrowheads="1"/>
+          </p:cNvPicPr>
+          <p:nvPr/>
+        </p:nvPicPr>
+        <p:blipFill>
+          <a:blip r:embed="rId5">
+            <a:extLst>
+              <a:ext uri="{28A0092B-C50C-407E-A947-70E740481C1C}">
+                <a14:useLocalDpi xmlns:a14="http://schemas.microsoft.com/office/drawing/2010/main" val="0"/>
+              </a:ext>
+            </a:extLst>
+          </a:blip>
+          <a:srcRect/>
+          <a:stretch>
+            <a:fillRect/>
+          </a:stretch>
+        </p:blipFill>
+        <p:spPr bwMode="auto">
+          <a:xfrm>
+            <a:off x="3078863" y="2941650"/>
+            <a:ext cx="1441051" cy="2558875"/>
+          </a:xfrm>
+          <a:prstGeom prst="rect">
+            <a:avLst/>
+          </a:prstGeom>
+          <a:noFill/>
+          <a:ln>
+            <a:noFill/>
+          </a:ln>
+          <a:effectLst>
+            <a:outerShdw blurRad="63500" sx="102000" sy="102000" algn="ctr" rotWithShape="0">
+              <a:prstClr val="black">
+                <a:alpha val="40000"/>
+              </a:prstClr>
+            </a:outerShdw>
+          </a:effectLst>
+          <a:extLst>
+            <a:ext uri="{909E8E84-426E-40DD-AFC4-6F175D3DCCD1}">
+              <a14:hiddenFill xmlns:a14="http://schemas.microsoft.com/office/drawing/2010/main">
+                <a:solidFill>
+                  <a:schemeClr val="accent1"/>
+                </a:solidFill>
+              </a14:hiddenFill>
+            </a:ext>
+            <a:ext uri="{91240B29-F687-4F45-9708-019B960494DF}">
+              <a14:hiddenLine xmlns:a14="http://schemas.microsoft.com/office/drawing/2010/main" w="9525">
+                <a:solidFill>
+                  <a:schemeClr val="tx1"/>
+                </a:solidFill>
+                <a:miter lim="800000"/>
+                <a:headEnd/>
+                <a:tailEnd/>
+              </a14:hiddenLine>
+            </a:ext>
+          </a:extLst>
+        </p:spPr>
+      </p:pic>
+      <p:pic>
+        <p:nvPicPr>
+          <p:cNvPr id="9220" name="Picture 4"/>
+          <p:cNvPicPr>
+            <a:picLocks noChangeAspect="1" noChangeArrowheads="1"/>
+          </p:cNvPicPr>
+          <p:nvPr/>
+        </p:nvPicPr>
+        <p:blipFill>
+          <a:blip r:embed="rId6">
+            <a:extLst>
+              <a:ext uri="{28A0092B-C50C-407E-A947-70E740481C1C}">
+                <a14:useLocalDpi xmlns:a14="http://schemas.microsoft.com/office/drawing/2010/main" val="0"/>
+              </a:ext>
+            </a:extLst>
+          </a:blip>
+          <a:srcRect/>
+          <a:stretch>
+            <a:fillRect/>
+          </a:stretch>
+        </p:blipFill>
+        <p:spPr bwMode="auto">
+          <a:xfrm>
+            <a:off x="4730179" y="3508378"/>
+            <a:ext cx="1487212" cy="2626944"/>
+          </a:xfrm>
+          <a:prstGeom prst="rect">
+            <a:avLst/>
+          </a:prstGeom>
+          <a:noFill/>
+          <a:ln>
+            <a:noFill/>
+          </a:ln>
+          <a:effectLst>
+            <a:outerShdw blurRad="63500" sx="102000" sy="102000" algn="ctr" rotWithShape="0">
+              <a:prstClr val="black">
+                <a:alpha val="40000"/>
+              </a:prstClr>
+            </a:outerShdw>
+          </a:effectLst>
+          <a:extLst>
+            <a:ext uri="{909E8E84-426E-40DD-AFC4-6F175D3DCCD1}">
+              <a14:hiddenFill xmlns:a14="http://schemas.microsoft.com/office/drawing/2010/main">
+                <a:solidFill>
+                  <a:schemeClr val="accent1"/>
+                </a:solidFill>
+              </a14:hiddenFill>
+            </a:ext>
+            <a:ext uri="{91240B29-F687-4F45-9708-019B960494DF}">
+              <a14:hiddenLine xmlns:a14="http://schemas.microsoft.com/office/drawing/2010/main" w="9525">
+                <a:solidFill>
+                  <a:schemeClr val="tx1"/>
+                </a:solidFill>
+                <a:miter lim="800000"/>
+                <a:headEnd/>
+                <a:tailEnd/>
+              </a14:hiddenLine>
+            </a:ext>
+          </a:extLst>
+        </p:spPr>
+      </p:pic>
     </p:spTree>
     <p:extLst>
       <p:ext uri="{BB962C8B-B14F-4D97-AF65-F5344CB8AC3E}">
         <p14:creationId xmlns:p14="http://schemas.microsoft.com/office/powerpoint/2010/main" val="3487351463"/>
-      </p:ext>
-    </p:extLst>
-  </p:cSld>
-  <p:clrMapOvr>
-    <a:masterClrMapping/>
-  </p:clrMapOvr>
-  <mc:AlternateContent xmlns:mc="http://schemas.openxmlformats.org/markup-compatibility/2006" xmlns:p14="http://schemas.microsoft.com/office/powerpoint/2010/main">
-    <mc:Choice Requires="p14">
-      <p:transition spd="med" p14:dur="700">
-        <p:fade/>
-      </p:transition>
-    </mc:Choice>
-    <mc:Fallback xmlns="">
-      <p:transition spd="med">
-        <p:fade/>
-      </p:transition>
-    </mc:Fallback>
-  </mc:AlternateContent>
-  <p:timing>
-    <p:tnLst>
-      <p:par>
-        <p:cTn id="1" dur="indefinite" restart="never" nodeType="tmRoot"/>
-      </p:par>
-    </p:tnLst>
-  </p:timing>
-</p:sld>
-</file>
-
-<file path=ppt/slides/slide19.xml><?xml version="1.0" encoding="utf-8"?>
-<p:sld xmlns:a="http://schemas.openxmlformats.org/drawingml/2006/main" xmlns:r="http://schemas.openxmlformats.org/officeDocument/2006/relationships" xmlns:p="http://schemas.openxmlformats.org/presentationml/2006/main">
-  <p:cSld>
-    <p:spTree>
-      <p:nvGrpSpPr>
-        <p:cNvPr id="1" name=""/>
-        <p:cNvGrpSpPr/>
-        <p:nvPr/>
-      </p:nvGrpSpPr>
-      <p:grpSpPr>
-        <a:xfrm>
-          <a:off x="0" y="0"/>
-          <a:ext cx="0" cy="0"/>
-          <a:chOff x="0" y="0"/>
-          <a:chExt cx="0" cy="0"/>
-        </a:xfrm>
-      </p:grpSpPr>
-      <p:sp>
-        <p:nvSpPr>
-          <p:cNvPr id="2" name="1 Título"/>
-          <p:cNvSpPr>
-            <a:spLocks noGrp="1"/>
-          </p:cNvSpPr>
-          <p:nvPr>
-            <p:ph type="title"/>
-          </p:nvPr>
-        </p:nvSpPr>
-        <p:spPr>
-          <a:xfrm>
-            <a:off x="457200" y="274638"/>
-            <a:ext cx="7620000" cy="6322714"/>
-          </a:xfrm>
-        </p:spPr>
-        <p:txBody>
-          <a:bodyPr/>
-          <a:lstStyle/>
-          <a:p>
-            <a:pPr algn="ctr"/>
-            <a:r>
-              <a:rPr lang="en-US" dirty="0" smtClean="0"/>
-              <a:t>Videos</a:t>
-            </a:r>
-            <a:endParaRPr lang="es-VE" dirty="0"/>
-          </a:p>
-        </p:txBody>
-      </p:sp>
-    </p:spTree>
-    <p:extLst>
-      <p:ext uri="{BB962C8B-B14F-4D97-AF65-F5344CB8AC3E}">
-        <p14:creationId xmlns:p14="http://schemas.microsoft.com/office/powerpoint/2010/main" val="341362080"/>
       </p:ext>
     </p:extLst>
   </p:cSld>
@@ -10979,6 +10745,67 @@
           <a:chExt cx="0" cy="0"/>
         </a:xfrm>
       </p:grpSpPr>
+      <p:pic>
+        <p:nvPicPr>
+          <p:cNvPr id="1026" name="Picture 2"/>
+          <p:cNvPicPr>
+            <a:picLocks noChangeAspect="1" noChangeArrowheads="1"/>
+          </p:cNvPicPr>
+          <p:nvPr/>
+        </p:nvPicPr>
+        <p:blipFill>
+          <a:blip r:embed="rId2">
+            <a:extLst>
+              <a:ext uri="{28A0092B-C50C-407E-A947-70E740481C1C}">
+                <a14:useLocalDpi xmlns:a14="http://schemas.microsoft.com/office/drawing/2010/main" val="0"/>
+              </a:ext>
+            </a:extLst>
+          </a:blip>
+          <a:srcRect/>
+          <a:stretch>
+            <a:fillRect/>
+          </a:stretch>
+        </p:blipFill>
+        <p:spPr bwMode="auto">
+          <a:xfrm>
+            <a:off x="1012566" y="2633969"/>
+            <a:ext cx="1903340" cy="3384376"/>
+          </a:xfrm>
+          <a:prstGeom prst="rect">
+            <a:avLst/>
+          </a:prstGeom>
+          <a:noFill/>
+          <a:ln>
+            <a:noFill/>
+          </a:ln>
+          <a:effectLst>
+            <a:outerShdw blurRad="63500" sx="102000" sy="102000" algn="ctr" rotWithShape="0">
+              <a:prstClr val="black">
+                <a:alpha val="40000"/>
+              </a:prstClr>
+            </a:outerShdw>
+          </a:effectLst>
+          <a:extLst>
+            <a:ext uri="{909E8E84-426E-40DD-AFC4-6F175D3DCCD1}">
+              <a14:hiddenFill xmlns:a14="http://schemas.microsoft.com/office/drawing/2010/main">
+                <a:solidFill>
+                  <a:schemeClr val="accent1"/>
+                </a:solidFill>
+              </a14:hiddenFill>
+            </a:ext>
+            <a:ext uri="{91240B29-F687-4F45-9708-019B960494DF}">
+              <a14:hiddenLine xmlns:a14="http://schemas.microsoft.com/office/drawing/2010/main" w="9525">
+                <a:solidFill>
+                  <a:schemeClr val="tx1"/>
+                </a:solidFill>
+                <a:miter lim="800000"/>
+                <a:headEnd/>
+                <a:tailEnd/>
+              </a14:hiddenLine>
+            </a:ext>
+          </a:extLst>
+        </p:spPr>
+      </p:pic>
       <p:sp>
         <p:nvSpPr>
           <p:cNvPr id="2" name="1 Título"/>
@@ -11040,7 +10867,7 @@
           <p:nvPr/>
         </p:nvPicPr>
         <p:blipFill>
-          <a:blip r:embed="rId2">
+          <a:blip r:embed="rId3">
             <a:extLst>
               <a:ext uri="{28A0092B-C50C-407E-A947-70E740481C1C}">
                 <a14:useLocalDpi xmlns:a14="http://schemas.microsoft.com/office/drawing/2010/main" val="0"/>
@@ -11105,72 +10932,7 @@
       </p:pic>
       <p:pic>
         <p:nvPicPr>
-          <p:cNvPr id="10242" name="Picture 2"/>
-          <p:cNvPicPr>
-            <a:picLocks noChangeAspect="1" noChangeArrowheads="1"/>
-          </p:cNvPicPr>
-          <p:nvPr/>
-        </p:nvPicPr>
-        <p:blipFill>
-          <a:blip r:embed="rId3">
-            <a:extLst>
-              <a:ext uri="{28A0092B-C50C-407E-A947-70E740481C1C}">
-                <a14:useLocalDpi xmlns:a14="http://schemas.microsoft.com/office/drawing/2010/main" val="0"/>
-              </a:ext>
-            </a:extLst>
-          </a:blip>
-          <a:srcRect/>
-          <a:stretch>
-            <a:fillRect/>
-          </a:stretch>
-        </p:blipFill>
-        <p:spPr bwMode="auto">
-          <a:xfrm>
-            <a:off x="1015345" y="2636912"/>
-            <a:ext cx="1897781" cy="3384376"/>
-          </a:xfrm>
-          <a:prstGeom prst="rect">
-            <a:avLst/>
-          </a:prstGeom>
-          <a:noFill/>
-          <a:ln w="9525">
-            <a:noFill/>
-            <a:miter lim="800000"/>
-            <a:headEnd/>
-            <a:tailEnd/>
-          </a:ln>
-          <a:effectLst>
-            <a:outerShdw blurRad="63500" sx="102000" sy="102000" algn="ctr" rotWithShape="0">
-              <a:prstClr val="black">
-                <a:alpha val="40000"/>
-              </a:prstClr>
-            </a:outerShdw>
-          </a:effectLst>
-          <a:scene3d>
-            <a:camera prst="orthographicFront">
-              <a:rot lat="0" lon="0" rev="0"/>
-            </a:camera>
-            <a:lightRig rig="glow" dir="t">
-              <a:rot lat="0" lon="0" rev="14100000"/>
-            </a:lightRig>
-          </a:scene3d>
-          <a:sp3d prstMaterial="softEdge">
-            <a:bevelT w="127000" prst="artDeco"/>
-          </a:sp3d>
-          <a:extLst>
-            <a:ext uri="{909E8E84-426E-40DD-AFC4-6F175D3DCCD1}">
-              <a14:hiddenFill xmlns:a14="http://schemas.microsoft.com/office/drawing/2010/main">
-                <a:solidFill>
-                  <a:schemeClr val="accent1"/>
-                </a:solidFill>
-              </a14:hiddenFill>
-            </a:ext>
-          </a:extLst>
-        </p:spPr>
-      </p:pic>
-      <p:pic>
-        <p:nvPicPr>
-          <p:cNvPr id="10243" name="Picture 3"/>
+          <p:cNvPr id="10244" name="Picture 4"/>
           <p:cNvPicPr>
             <a:picLocks noChangeAspect="1" noChangeArrowheads="1"/>
           </p:cNvPicPr>
@@ -11191,8 +10953,8 @@
         </p:blipFill>
         <p:spPr bwMode="auto">
           <a:xfrm>
-            <a:off x="3491880" y="2612513"/>
-            <a:ext cx="1920437" cy="3408775"/>
+            <a:off x="5996069" y="2612513"/>
+            <a:ext cx="1893391" cy="3382753"/>
           </a:xfrm>
           <a:prstGeom prst="rect">
             <a:avLst/>
@@ -11229,74 +10991,10 @@
           </a:extLst>
         </p:spPr>
       </p:pic>
-      <p:pic>
-        <p:nvPicPr>
-          <p:cNvPr id="10244" name="Picture 4"/>
-          <p:cNvPicPr>
-            <a:picLocks noChangeAspect="1" noChangeArrowheads="1"/>
-          </p:cNvPicPr>
-          <p:nvPr/>
-        </p:nvPicPr>
-        <p:blipFill>
-          <a:blip r:embed="rId5">
-            <a:extLst>
-              <a:ext uri="{28A0092B-C50C-407E-A947-70E740481C1C}">
-                <a14:useLocalDpi xmlns:a14="http://schemas.microsoft.com/office/drawing/2010/main" val="0"/>
-              </a:ext>
-            </a:extLst>
-          </a:blip>
-          <a:srcRect/>
-          <a:stretch>
-            <a:fillRect/>
-          </a:stretch>
-        </p:blipFill>
-        <p:spPr bwMode="auto">
-          <a:xfrm>
-            <a:off x="5996069" y="2612513"/>
-            <a:ext cx="1893391" cy="3382753"/>
-          </a:xfrm>
-          <a:prstGeom prst="rect">
-            <a:avLst/>
-          </a:prstGeom>
-          <a:noFill/>
-          <a:ln>
-            <a:noFill/>
-          </a:ln>
-          <a:effectLst>
-            <a:outerShdw blurRad="63500" sx="102000" sy="102000" algn="ctr" rotWithShape="0">
-              <a:prstClr val="black">
-                <a:alpha val="40000"/>
-              </a:prstClr>
-            </a:outerShdw>
-          </a:effectLst>
-          <a:extLst>
-            <a:ext uri="{909E8E84-426E-40DD-AFC4-6F175D3DCCD1}">
-              <a14:hiddenFill xmlns:a14="http://schemas.microsoft.com/office/drawing/2010/main">
-                <a:solidFill>
-                  <a:schemeClr val="accent1"/>
-                </a:solidFill>
-              </a14:hiddenFill>
-            </a:ext>
-            <a:ext uri="{91240B29-F687-4F45-9708-019B960494DF}">
-              <a14:hiddenLine xmlns:a14="http://schemas.microsoft.com/office/drawing/2010/main" w="9525">
-                <a:solidFill>
-                  <a:schemeClr val="tx1"/>
-                </a:solidFill>
-                <a:miter lim="800000"/>
-                <a:headEnd/>
-                <a:tailEnd/>
-              </a14:hiddenLine>
-            </a:ext>
-          </a:extLst>
-        </p:spPr>
-      </p:pic>
       <p:cxnSp>
         <p:nvCxnSpPr>
           <p:cNvPr id="10" name="9 Conector curvado"/>
-          <p:cNvCxnSpPr>
-            <a:stCxn id="10242" idx="0"/>
-            <a:endCxn id="10243" idx="0"/>
-          </p:cNvCxnSpPr>
+          <p:cNvCxnSpPr/>
           <p:nvPr/>
         </p:nvCxnSpPr>
         <p:spPr>
@@ -11332,7 +11030,6 @@
         <p:nvCxnSpPr>
           <p:cNvPr id="13" name="12 Conector curvado"/>
           <p:cNvCxnSpPr>
-            <a:stCxn id="10243" idx="0"/>
             <a:endCxn id="10244" idx="0"/>
           </p:cNvCxnSpPr>
           <p:nvPr/>
@@ -11467,13 +11164,15 @@
       <p:cxnSp>
         <p:nvCxnSpPr>
           <p:cNvPr id="17" name="16 Conector recto de flecha"/>
-          <p:cNvCxnSpPr/>
+          <p:cNvCxnSpPr>
+            <a:stCxn id="26" idx="0"/>
+          </p:cNvCxnSpPr>
           <p:nvPr/>
         </p:nvCxnSpPr>
         <p:spPr>
-          <a:xfrm>
-            <a:off x="793272" y="5229200"/>
-            <a:ext cx="864095" cy="0"/>
+          <a:xfrm flipH="1" flipV="1">
+            <a:off x="2771800" y="5373216"/>
+            <a:ext cx="144106" cy="792088"/>
           </a:xfrm>
           <a:prstGeom prst="straightConnector1">
             <a:avLst/>
@@ -11483,13 +11182,13 @@
           </a:ln>
         </p:spPr>
         <p:style>
-          <a:lnRef idx="2">
+          <a:lnRef idx="1">
             <a:schemeClr val="accent1"/>
           </a:lnRef>
           <a:fillRef idx="0">
             <a:schemeClr val="accent1"/>
           </a:fillRef>
-          <a:effectRef idx="1">
+          <a:effectRef idx="0">
             <a:schemeClr val="accent1"/>
           </a:effectRef>
           <a:fontRef idx="minor">
@@ -11500,13 +11199,15 @@
       <p:cxnSp>
         <p:nvCxnSpPr>
           <p:cNvPr id="23" name="22 Conector recto de flecha"/>
-          <p:cNvCxnSpPr/>
+          <p:cNvCxnSpPr>
+            <a:stCxn id="31" idx="0"/>
+          </p:cNvCxnSpPr>
           <p:nvPr/>
         </p:nvCxnSpPr>
         <p:spPr>
-          <a:xfrm flipH="1" flipV="1">
-            <a:off x="2267744" y="5455206"/>
-            <a:ext cx="645382" cy="782106"/>
+          <a:xfrm flipV="1">
+            <a:off x="1225320" y="5229200"/>
+            <a:ext cx="466360" cy="1008112"/>
           </a:xfrm>
           <a:prstGeom prst="straightConnector1">
             <a:avLst/>
@@ -11516,13 +11217,13 @@
           </a:ln>
         </p:spPr>
         <p:style>
-          <a:lnRef idx="2">
+          <a:lnRef idx="1">
             <a:schemeClr val="accent1"/>
           </a:lnRef>
           <a:fillRef idx="0">
             <a:schemeClr val="accent1"/>
           </a:fillRef>
-          <a:effectRef idx="1">
+          <a:effectRef idx="0">
             <a:schemeClr val="accent1"/>
           </a:effectRef>
           <a:fontRef idx="minor">
@@ -11538,7 +11239,7 @@
         </p:nvSpPr>
         <p:spPr>
           <a:xfrm>
-            <a:off x="62083" y="5075311"/>
+            <a:off x="2465010" y="6165304"/>
             <a:ext cx="901792" cy="307777"/>
           </a:xfrm>
           <a:prstGeom prst="rect">
@@ -11568,7 +11269,7 @@
         </p:nvSpPr>
         <p:spPr>
           <a:xfrm>
-            <a:off x="2187399" y="6253743"/>
+            <a:off x="342376" y="6237312"/>
             <a:ext cx="1765888" cy="307777"/>
           </a:xfrm>
           <a:prstGeom prst="rect">
@@ -11590,6 +11291,67 @@
           </a:p>
         </p:txBody>
       </p:sp>
+      <p:pic>
+        <p:nvPicPr>
+          <p:cNvPr id="1027" name="Picture 3"/>
+          <p:cNvPicPr>
+            <a:picLocks noChangeAspect="1" noChangeArrowheads="1"/>
+          </p:cNvPicPr>
+          <p:nvPr/>
+        </p:nvPicPr>
+        <p:blipFill>
+          <a:blip r:embed="rId5">
+            <a:extLst>
+              <a:ext uri="{28A0092B-C50C-407E-A947-70E740481C1C}">
+                <a14:useLocalDpi xmlns:a14="http://schemas.microsoft.com/office/drawing/2010/main" val="0"/>
+              </a:ext>
+            </a:extLst>
+          </a:blip>
+          <a:srcRect/>
+          <a:stretch>
+            <a:fillRect/>
+          </a:stretch>
+        </p:blipFill>
+        <p:spPr bwMode="auto">
+          <a:xfrm>
+            <a:off x="3494292" y="2645028"/>
+            <a:ext cx="1883678" cy="3376403"/>
+          </a:xfrm>
+          <a:prstGeom prst="rect">
+            <a:avLst/>
+          </a:prstGeom>
+          <a:noFill/>
+          <a:ln>
+            <a:noFill/>
+          </a:ln>
+          <a:effectLst>
+            <a:outerShdw blurRad="63500" sx="102000" sy="102000" algn="ctr" rotWithShape="0">
+              <a:prstClr val="black">
+                <a:alpha val="40000"/>
+              </a:prstClr>
+            </a:outerShdw>
+          </a:effectLst>
+          <a:extLst>
+            <a:ext uri="{909E8E84-426E-40DD-AFC4-6F175D3DCCD1}">
+              <a14:hiddenFill xmlns:a14="http://schemas.microsoft.com/office/drawing/2010/main">
+                <a:solidFill>
+                  <a:schemeClr val="accent1"/>
+                </a:solidFill>
+              </a14:hiddenFill>
+            </a:ext>
+            <a:ext uri="{91240B29-F687-4F45-9708-019B960494DF}">
+              <a14:hiddenLine xmlns:a14="http://schemas.microsoft.com/office/drawing/2010/main" w="9525">
+                <a:solidFill>
+                  <a:schemeClr val="tx1"/>
+                </a:solidFill>
+                <a:miter lim="800000"/>
+                <a:headEnd/>
+                <a:tailEnd/>
+              </a14:hiddenLine>
+            </a:ext>
+          </a:extLst>
+        </p:spPr>
+      </p:pic>
     </p:spTree>
     <p:extLst>
       <p:ext uri="{BB962C8B-B14F-4D97-AF65-F5344CB8AC3E}">
@@ -11639,6 +11401,67 @@
           <a:chExt cx="0" cy="0"/>
         </a:xfrm>
       </p:grpSpPr>
+      <p:pic>
+        <p:nvPicPr>
+          <p:cNvPr id="2051" name="Picture 3"/>
+          <p:cNvPicPr>
+            <a:picLocks noChangeAspect="1" noChangeArrowheads="1"/>
+          </p:cNvPicPr>
+          <p:nvPr/>
+        </p:nvPicPr>
+        <p:blipFill>
+          <a:blip r:embed="rId2">
+            <a:extLst>
+              <a:ext uri="{28A0092B-C50C-407E-A947-70E740481C1C}">
+                <a14:useLocalDpi xmlns:a14="http://schemas.microsoft.com/office/drawing/2010/main" val="0"/>
+              </a:ext>
+            </a:extLst>
+          </a:blip>
+          <a:srcRect/>
+          <a:stretch>
+            <a:fillRect/>
+          </a:stretch>
+        </p:blipFill>
+        <p:spPr bwMode="auto">
+          <a:xfrm>
+            <a:off x="3341663" y="2710831"/>
+            <a:ext cx="1594547" cy="2808970"/>
+          </a:xfrm>
+          <a:prstGeom prst="rect">
+            <a:avLst/>
+          </a:prstGeom>
+          <a:noFill/>
+          <a:ln>
+            <a:noFill/>
+          </a:ln>
+          <a:effectLst>
+            <a:outerShdw blurRad="63500" sx="102000" sy="102000" algn="ctr" rotWithShape="0">
+              <a:prstClr val="black">
+                <a:alpha val="40000"/>
+              </a:prstClr>
+            </a:outerShdw>
+          </a:effectLst>
+          <a:extLst>
+            <a:ext uri="{909E8E84-426E-40DD-AFC4-6F175D3DCCD1}">
+              <a14:hiddenFill xmlns:a14="http://schemas.microsoft.com/office/drawing/2010/main">
+                <a:solidFill>
+                  <a:schemeClr val="accent1"/>
+                </a:solidFill>
+              </a14:hiddenFill>
+            </a:ext>
+            <a:ext uri="{91240B29-F687-4F45-9708-019B960494DF}">
+              <a14:hiddenLine xmlns:a14="http://schemas.microsoft.com/office/drawing/2010/main" w="9525">
+                <a:solidFill>
+                  <a:schemeClr val="tx1"/>
+                </a:solidFill>
+                <a:miter lim="800000"/>
+                <a:headEnd/>
+                <a:tailEnd/>
+              </a14:hiddenLine>
+            </a:ext>
+          </a:extLst>
+        </p:spPr>
+      </p:pic>
       <p:sp>
         <p:nvSpPr>
           <p:cNvPr id="2" name="1 Título"/>
@@ -11700,7 +11523,7 @@
           <p:nvPr/>
         </p:nvPicPr>
         <p:blipFill>
-          <a:blip r:embed="rId2">
+          <a:blip r:embed="rId3">
             <a:extLst>
               <a:ext uri="{28A0092B-C50C-407E-A947-70E740481C1C}">
                 <a14:useLocalDpi xmlns:a14="http://schemas.microsoft.com/office/drawing/2010/main" val="0"/>
@@ -11765,68 +11588,7 @@
       </p:pic>
       <p:pic>
         <p:nvPicPr>
-          <p:cNvPr id="11266" name="Picture 2"/>
-          <p:cNvPicPr>
-            <a:picLocks noChangeAspect="1" noChangeArrowheads="1"/>
-          </p:cNvPicPr>
-          <p:nvPr/>
-        </p:nvPicPr>
-        <p:blipFill>
-          <a:blip r:embed="rId3">
-            <a:extLst>
-              <a:ext uri="{28A0092B-C50C-407E-A947-70E740481C1C}">
-                <a14:useLocalDpi xmlns:a14="http://schemas.microsoft.com/office/drawing/2010/main" val="0"/>
-              </a:ext>
-            </a:extLst>
-          </a:blip>
-          <a:srcRect/>
-          <a:stretch>
-            <a:fillRect/>
-          </a:stretch>
-        </p:blipFill>
-        <p:spPr bwMode="auto">
-          <a:xfrm>
-            <a:off x="1045171" y="2708920"/>
-            <a:ext cx="1582147" cy="2808312"/>
-          </a:xfrm>
-          <a:prstGeom prst="rect">
-            <a:avLst/>
-          </a:prstGeom>
-          <a:noFill/>
-          <a:ln>
-            <a:noFill/>
-          </a:ln>
-          <a:effectLst>
-            <a:outerShdw blurRad="63500" sx="102000" sy="102000" algn="ctr" rotWithShape="0">
-              <a:prstClr val="black">
-                <a:alpha val="40000"/>
-              </a:prstClr>
-            </a:outerShdw>
-          </a:effectLst>
-          <a:extLst>
-            <a:ext uri="{909E8E84-426E-40DD-AFC4-6F175D3DCCD1}">
-              <a14:hiddenFill xmlns:a14="http://schemas.microsoft.com/office/drawing/2010/main">
-                <a:solidFill>
-                  <a:schemeClr val="accent1"/>
-                </a:solidFill>
-              </a14:hiddenFill>
-            </a:ext>
-            <a:ext uri="{91240B29-F687-4F45-9708-019B960494DF}">
-              <a14:hiddenLine xmlns:a14="http://schemas.microsoft.com/office/drawing/2010/main" w="9525">
-                <a:solidFill>
-                  <a:schemeClr val="tx1"/>
-                </a:solidFill>
-                <a:miter lim="800000"/>
-                <a:headEnd/>
-                <a:tailEnd/>
-              </a14:hiddenLine>
-            </a:ext>
-          </a:extLst>
-        </p:spPr>
-      </p:pic>
-      <p:pic>
-        <p:nvPicPr>
-          <p:cNvPr id="11267" name="Picture 3"/>
+          <p:cNvPr id="11268" name="Picture 4"/>
           <p:cNvPicPr>
             <a:picLocks noChangeAspect="1" noChangeArrowheads="1"/>
           </p:cNvPicPr>
@@ -11847,8 +11609,8 @@
         </p:blipFill>
         <p:spPr bwMode="auto">
           <a:xfrm>
-            <a:off x="3347864" y="2707010"/>
-            <a:ext cx="1582148" cy="2808312"/>
+            <a:off x="5632276" y="2708920"/>
+            <a:ext cx="1578293" cy="2806402"/>
           </a:xfrm>
           <a:prstGeom prst="rect">
             <a:avLst/>
@@ -11885,74 +11647,10 @@
           </a:extLst>
         </p:spPr>
       </p:pic>
-      <p:pic>
-        <p:nvPicPr>
-          <p:cNvPr id="11268" name="Picture 4"/>
-          <p:cNvPicPr>
-            <a:picLocks noChangeAspect="1" noChangeArrowheads="1"/>
-          </p:cNvPicPr>
-          <p:nvPr/>
-        </p:nvPicPr>
-        <p:blipFill>
-          <a:blip r:embed="rId5">
-            <a:extLst>
-              <a:ext uri="{28A0092B-C50C-407E-A947-70E740481C1C}">
-                <a14:useLocalDpi xmlns:a14="http://schemas.microsoft.com/office/drawing/2010/main" val="0"/>
-              </a:ext>
-            </a:extLst>
-          </a:blip>
-          <a:srcRect/>
-          <a:stretch>
-            <a:fillRect/>
-          </a:stretch>
-        </p:blipFill>
-        <p:spPr bwMode="auto">
-          <a:xfrm>
-            <a:off x="5632276" y="2708920"/>
-            <a:ext cx="1578293" cy="2806402"/>
-          </a:xfrm>
-          <a:prstGeom prst="rect">
-            <a:avLst/>
-          </a:prstGeom>
-          <a:noFill/>
-          <a:ln>
-            <a:noFill/>
-          </a:ln>
-          <a:effectLst>
-            <a:outerShdw blurRad="63500" sx="102000" sy="102000" algn="ctr" rotWithShape="0">
-              <a:prstClr val="black">
-                <a:alpha val="40000"/>
-              </a:prstClr>
-            </a:outerShdw>
-          </a:effectLst>
-          <a:extLst>
-            <a:ext uri="{909E8E84-426E-40DD-AFC4-6F175D3DCCD1}">
-              <a14:hiddenFill xmlns:a14="http://schemas.microsoft.com/office/drawing/2010/main">
-                <a:solidFill>
-                  <a:schemeClr val="accent1"/>
-                </a:solidFill>
-              </a14:hiddenFill>
-            </a:ext>
-            <a:ext uri="{91240B29-F687-4F45-9708-019B960494DF}">
-              <a14:hiddenLine xmlns:a14="http://schemas.microsoft.com/office/drawing/2010/main" w="9525">
-                <a:solidFill>
-                  <a:schemeClr val="tx1"/>
-                </a:solidFill>
-                <a:miter lim="800000"/>
-                <a:headEnd/>
-                <a:tailEnd/>
-              </a14:hiddenLine>
-            </a:ext>
-          </a:extLst>
-        </p:spPr>
-      </p:pic>
       <p:cxnSp>
         <p:nvCxnSpPr>
           <p:cNvPr id="6" name="5 Conector curvado"/>
-          <p:cNvCxnSpPr>
-            <a:stCxn id="11266" idx="0"/>
-            <a:endCxn id="11267" idx="0"/>
-          </p:cNvCxnSpPr>
+          <p:cNvCxnSpPr/>
           <p:nvPr/>
         </p:nvCxnSpPr>
         <p:spPr>
@@ -11988,7 +11686,6 @@
         <p:nvCxnSpPr>
           <p:cNvPr id="9" name="8 Conector curvado"/>
           <p:cNvCxnSpPr>
-            <a:stCxn id="11267" idx="0"/>
             <a:endCxn id="11268" idx="0"/>
           </p:cNvCxnSpPr>
           <p:nvPr/>
@@ -12175,6 +11872,67 @@
           </a:p>
         </p:txBody>
       </p:sp>
+      <p:pic>
+        <p:nvPicPr>
+          <p:cNvPr id="2050" name="Picture 2"/>
+          <p:cNvPicPr>
+            <a:picLocks noChangeAspect="1" noChangeArrowheads="1"/>
+          </p:cNvPicPr>
+          <p:nvPr/>
+        </p:nvPicPr>
+        <p:blipFill>
+          <a:blip r:embed="rId5">
+            <a:extLst>
+              <a:ext uri="{28A0092B-C50C-407E-A947-70E740481C1C}">
+                <a14:useLocalDpi xmlns:a14="http://schemas.microsoft.com/office/drawing/2010/main" val="0"/>
+              </a:ext>
+            </a:extLst>
+          </a:blip>
+          <a:srcRect/>
+          <a:stretch>
+            <a:fillRect/>
+          </a:stretch>
+        </p:blipFill>
+        <p:spPr bwMode="auto">
+          <a:xfrm>
+            <a:off x="1048845" y="2710831"/>
+            <a:ext cx="1583225" cy="2806401"/>
+          </a:xfrm>
+          <a:prstGeom prst="rect">
+            <a:avLst/>
+          </a:prstGeom>
+          <a:noFill/>
+          <a:ln>
+            <a:noFill/>
+          </a:ln>
+          <a:effectLst>
+            <a:outerShdw blurRad="63500" sx="102000" sy="102000" algn="ctr" rotWithShape="0">
+              <a:prstClr val="black">
+                <a:alpha val="40000"/>
+              </a:prstClr>
+            </a:outerShdw>
+          </a:effectLst>
+          <a:extLst>
+            <a:ext uri="{909E8E84-426E-40DD-AFC4-6F175D3DCCD1}">
+              <a14:hiddenFill xmlns:a14="http://schemas.microsoft.com/office/drawing/2010/main">
+                <a:solidFill>
+                  <a:schemeClr val="accent1"/>
+                </a:solidFill>
+              </a14:hiddenFill>
+            </a:ext>
+            <a:ext uri="{91240B29-F687-4F45-9708-019B960494DF}">
+              <a14:hiddenLine xmlns:a14="http://schemas.microsoft.com/office/drawing/2010/main" w="9525">
+                <a:solidFill>
+                  <a:schemeClr val="tx1"/>
+                </a:solidFill>
+                <a:miter lim="800000"/>
+                <a:headEnd/>
+                <a:tailEnd/>
+              </a14:hiddenLine>
+            </a:ext>
+          </a:extLst>
+        </p:spPr>
+      </p:pic>
     </p:spTree>
     <p:extLst>
       <p:ext uri="{BB962C8B-B14F-4D97-AF65-F5344CB8AC3E}">
@@ -12226,7 +11984,7 @@
       </p:grpSpPr>
       <p:pic>
         <p:nvPicPr>
-          <p:cNvPr id="1026" name="Picture 2"/>
+          <p:cNvPr id="3075" name="Picture 3"/>
           <p:cNvPicPr>
             <a:picLocks noChangeAspect="1" noChangeArrowheads="1"/>
           </p:cNvPicPr>
@@ -12247,8 +12005,8 @@
         </p:blipFill>
         <p:spPr bwMode="auto">
           <a:xfrm>
-            <a:off x="5849642" y="2132854"/>
-            <a:ext cx="2066129" cy="4248476"/>
+            <a:off x="5728132" y="2364900"/>
+            <a:ext cx="2344091" cy="4140497"/>
           </a:xfrm>
           <a:prstGeom prst="rect">
             <a:avLst/>
@@ -12285,6 +12043,67 @@
           </a:extLst>
         </p:spPr>
       </p:pic>
+      <p:pic>
+        <p:nvPicPr>
+          <p:cNvPr id="3074" name="Picture 2"/>
+          <p:cNvPicPr>
+            <a:picLocks noChangeAspect="1" noChangeArrowheads="1"/>
+          </p:cNvPicPr>
+          <p:nvPr/>
+        </p:nvPicPr>
+        <p:blipFill>
+          <a:blip r:embed="rId3">
+            <a:extLst>
+              <a:ext uri="{28A0092B-C50C-407E-A947-70E740481C1C}">
+                <a14:useLocalDpi xmlns:a14="http://schemas.microsoft.com/office/drawing/2010/main" val="0"/>
+              </a:ext>
+            </a:extLst>
+          </a:blip>
+          <a:srcRect/>
+          <a:stretch>
+            <a:fillRect/>
+          </a:stretch>
+        </p:blipFill>
+        <p:spPr bwMode="auto">
+          <a:xfrm>
+            <a:off x="1331640" y="2364900"/>
+            <a:ext cx="2343643" cy="4112294"/>
+          </a:xfrm>
+          <a:prstGeom prst="rect">
+            <a:avLst/>
+          </a:prstGeom>
+          <a:noFill/>
+          <a:ln>
+            <a:noFill/>
+          </a:ln>
+          <a:effectLst>
+            <a:outerShdw blurRad="63500" sx="102000" sy="102000" algn="ctr" rotWithShape="0">
+              <a:prstClr val="black">
+                <a:alpha val="40000"/>
+              </a:prstClr>
+            </a:outerShdw>
+          </a:effectLst>
+          <a:extLst>
+            <a:ext uri="{909E8E84-426E-40DD-AFC4-6F175D3DCCD1}">
+              <a14:hiddenFill xmlns:a14="http://schemas.microsoft.com/office/drawing/2010/main">
+                <a:solidFill>
+                  <a:schemeClr val="accent1"/>
+                </a:solidFill>
+              </a14:hiddenFill>
+            </a:ext>
+            <a:ext uri="{91240B29-F687-4F45-9708-019B960494DF}">
+              <a14:hiddenLine xmlns:a14="http://schemas.microsoft.com/office/drawing/2010/main" w="9525">
+                <a:solidFill>
+                  <a:schemeClr val="tx1"/>
+                </a:solidFill>
+                <a:miter lim="800000"/>
+                <a:headEnd/>
+                <a:tailEnd/>
+              </a14:hiddenLine>
+            </a:ext>
+          </a:extLst>
+        </p:spPr>
+      </p:pic>
       <p:sp>
         <p:nvSpPr>
           <p:cNvPr id="2" name="1 Título"/>
@@ -12347,7 +12166,7 @@
           <p:nvPr/>
         </p:nvPicPr>
         <p:blipFill>
-          <a:blip r:embed="rId3">
+          <a:blip r:embed="rId4">
             <a:extLst>
               <a:ext uri="{28A0092B-C50C-407E-A947-70E740481C1C}">
                 <a14:useLocalDpi xmlns:a14="http://schemas.microsoft.com/office/drawing/2010/main" val="0"/>
@@ -12410,67 +12229,6 @@
           </a:extLst>
         </p:spPr>
       </p:pic>
-      <p:pic>
-        <p:nvPicPr>
-          <p:cNvPr id="12290" name="Picture 2"/>
-          <p:cNvPicPr>
-            <a:picLocks noChangeAspect="1" noChangeArrowheads="1"/>
-          </p:cNvPicPr>
-          <p:nvPr/>
-        </p:nvPicPr>
-        <p:blipFill>
-          <a:blip r:embed="rId4">
-            <a:extLst>
-              <a:ext uri="{28A0092B-C50C-407E-A947-70E740481C1C}">
-                <a14:useLocalDpi xmlns:a14="http://schemas.microsoft.com/office/drawing/2010/main" val="0"/>
-              </a:ext>
-            </a:extLst>
-          </a:blip>
-          <a:srcRect/>
-          <a:stretch>
-            <a:fillRect/>
-          </a:stretch>
-        </p:blipFill>
-        <p:spPr bwMode="auto">
-          <a:xfrm>
-            <a:off x="1414540" y="2132854"/>
-            <a:ext cx="2304256" cy="4128763"/>
-          </a:xfrm>
-          <a:prstGeom prst="rect">
-            <a:avLst/>
-          </a:prstGeom>
-          <a:noFill/>
-          <a:ln>
-            <a:noFill/>
-          </a:ln>
-          <a:effectLst>
-            <a:outerShdw blurRad="63500" sx="102000" sy="102000" algn="ctr" rotWithShape="0">
-              <a:prstClr val="black">
-                <a:alpha val="40000"/>
-              </a:prstClr>
-            </a:outerShdw>
-          </a:effectLst>
-          <a:extLst>
-            <a:ext uri="{909E8E84-426E-40DD-AFC4-6F175D3DCCD1}">
-              <a14:hiddenFill xmlns:a14="http://schemas.microsoft.com/office/drawing/2010/main">
-                <a:solidFill>
-                  <a:schemeClr val="accent1"/>
-                </a:solidFill>
-              </a14:hiddenFill>
-            </a:ext>
-            <a:ext uri="{91240B29-F687-4F45-9708-019B960494DF}">
-              <a14:hiddenLine xmlns:a14="http://schemas.microsoft.com/office/drawing/2010/main" w="9525">
-                <a:solidFill>
-                  <a:schemeClr val="tx1"/>
-                </a:solidFill>
-                <a:miter lim="800000"/>
-                <a:headEnd/>
-                <a:tailEnd/>
-              </a14:hiddenLine>
-            </a:ext>
-          </a:extLst>
-        </p:spPr>
-      </p:pic>
       <p:sp>
         <p:nvSpPr>
           <p:cNvPr id="4" name="3 Cerrar llave"/>
@@ -12479,7 +12237,7 @@
         </p:nvSpPr>
         <p:spPr>
           <a:xfrm>
-            <a:off x="3757884" y="4107134"/>
+            <a:off x="3757884" y="4241837"/>
             <a:ext cx="110269" cy="1698129"/>
           </a:xfrm>
           <a:prstGeom prst="rightBrace">
@@ -12517,7 +12275,7 @@
         </p:nvSpPr>
         <p:spPr>
           <a:xfrm>
-            <a:off x="3868153" y="4694588"/>
+            <a:off x="3868153" y="4725048"/>
             <a:ext cx="1872208" cy="523220"/>
           </a:xfrm>
           <a:prstGeom prst="rect">
@@ -12614,9 +12372,9 @@
           <p:nvPr/>
         </p:nvCxnSpPr>
         <p:spPr>
-          <a:xfrm>
-            <a:off x="899592" y="2852936"/>
-            <a:ext cx="1080120" cy="275084"/>
+          <a:xfrm flipV="1">
+            <a:off x="1187624" y="2990478"/>
+            <a:ext cx="2160240" cy="516876"/>
           </a:xfrm>
           <a:prstGeom prst="straightConnector1">
             <a:avLst/>
@@ -12648,7 +12406,7 @@
         </p:nvSpPr>
         <p:spPr>
           <a:xfrm>
-            <a:off x="107504" y="2348880"/>
+            <a:off x="-24333" y="3291910"/>
             <a:ext cx="1512168" cy="738664"/>
           </a:xfrm>
           <a:prstGeom prst="rect">
@@ -12679,7 +12437,7 @@
         <p:spPr>
           <a:xfrm>
             <a:off x="4856864" y="2636912"/>
-            <a:ext cx="1515336" cy="450632"/>
+            <a:ext cx="1326065" cy="776111"/>
           </a:xfrm>
           <a:prstGeom prst="straightConnector1">
             <a:avLst/>
@@ -12742,7 +12500,7 @@
         <p:spPr>
           <a:xfrm>
             <a:off x="5849642" y="1916832"/>
-            <a:ext cx="666574" cy="665932"/>
+            <a:ext cx="1098622" cy="1073646"/>
           </a:xfrm>
           <a:prstGeom prst="straightConnector1">
             <a:avLst/>

</xml_diff>

<commit_message>
cambios finales: arreglo de la presentacion y el informe, modificaciones visuales
</commit_message>
<xml_diff>
--- a/docs/presentacion/presentacion producto final Pasantias.pptx
+++ b/docs/presentacion/presentacion producto final Pasantias.pptx
@@ -212,7 +212,7 @@
           <a:p>
             <a:fld id="{653EA24F-18F7-4F91-9359-C9F9A023D2A2}" type="datetimeFigureOut">
               <a:rPr lang="es-VE" smtClean="0"/>
-              <a:t>15/10/2020</a:t>
+              <a:t>19/10/2020</a:t>
             </a:fld>
             <a:endParaRPr lang="es-VE"/>
           </a:p>
@@ -377,7 +377,7 @@
           <a:p>
             <a:fld id="{A63708E0-4069-43F6-B2CC-04F03E348597}" type="datetimeFigureOut">
               <a:rPr lang="es-VE" smtClean="0"/>
-              <a:t>15/10/2020</a:t>
+              <a:t>19/10/2020</a:t>
             </a:fld>
             <a:endParaRPr lang="es-VE"/>
           </a:p>
@@ -923,7 +923,7 @@
           <a:p>
             <a:fld id="{3A081D1D-6BD6-40F4-80EB-C898E09F6268}" type="datetimeFigureOut">
               <a:rPr lang="es-VE" smtClean="0"/>
-              <a:t>15/10/2020</a:t>
+              <a:t>19/10/2020</a:t>
             </a:fld>
             <a:endParaRPr lang="es-VE"/>
           </a:p>
@@ -1100,7 +1100,7 @@
           <a:p>
             <a:fld id="{3A081D1D-6BD6-40F4-80EB-C898E09F6268}" type="datetimeFigureOut">
               <a:rPr lang="es-VE" smtClean="0"/>
-              <a:t>15/10/2020</a:t>
+              <a:t>19/10/2020</a:t>
             </a:fld>
             <a:endParaRPr lang="es-VE"/>
           </a:p>
@@ -1287,7 +1287,7 @@
           <a:p>
             <a:fld id="{3A081D1D-6BD6-40F4-80EB-C898E09F6268}" type="datetimeFigureOut">
               <a:rPr lang="es-VE" smtClean="0"/>
-              <a:t>15/10/2020</a:t>
+              <a:t>19/10/2020</a:t>
             </a:fld>
             <a:endParaRPr lang="es-VE"/>
           </a:p>
@@ -1464,7 +1464,7 @@
           <a:p>
             <a:fld id="{3A081D1D-6BD6-40F4-80EB-C898E09F6268}" type="datetimeFigureOut">
               <a:rPr lang="es-VE" smtClean="0"/>
-              <a:t>15/10/2020</a:t>
+              <a:t>19/10/2020</a:t>
             </a:fld>
             <a:endParaRPr lang="es-VE"/>
           </a:p>
@@ -1717,7 +1717,7 @@
           <a:p>
             <a:fld id="{3A081D1D-6BD6-40F4-80EB-C898E09F6268}" type="datetimeFigureOut">
               <a:rPr lang="es-VE" smtClean="0"/>
-              <a:t>15/10/2020</a:t>
+              <a:t>19/10/2020</a:t>
             </a:fld>
             <a:endParaRPr lang="es-VE"/>
           </a:p>
@@ -2012,7 +2012,7 @@
           <a:p>
             <a:fld id="{3A081D1D-6BD6-40F4-80EB-C898E09F6268}" type="datetimeFigureOut">
               <a:rPr lang="es-VE" smtClean="0"/>
-              <a:t>15/10/2020</a:t>
+              <a:t>19/10/2020</a:t>
             </a:fld>
             <a:endParaRPr lang="es-VE"/>
           </a:p>
@@ -2453,7 +2453,7 @@
           <a:p>
             <a:fld id="{3A081D1D-6BD6-40F4-80EB-C898E09F6268}" type="datetimeFigureOut">
               <a:rPr lang="es-VE" smtClean="0"/>
-              <a:t>15/10/2020</a:t>
+              <a:t>19/10/2020</a:t>
             </a:fld>
             <a:endParaRPr lang="es-VE"/>
           </a:p>
@@ -2578,7 +2578,7 @@
           <a:p>
             <a:fld id="{3A081D1D-6BD6-40F4-80EB-C898E09F6268}" type="datetimeFigureOut">
               <a:rPr lang="es-VE" smtClean="0"/>
-              <a:t>15/10/2020</a:t>
+              <a:t>19/10/2020</a:t>
             </a:fld>
             <a:endParaRPr lang="es-VE"/>
           </a:p>
@@ -2680,7 +2680,7 @@
           <a:p>
             <a:fld id="{3A081D1D-6BD6-40F4-80EB-C898E09F6268}" type="datetimeFigureOut">
               <a:rPr lang="es-VE" smtClean="0"/>
-              <a:t>15/10/2020</a:t>
+              <a:t>19/10/2020</a:t>
             </a:fld>
             <a:endParaRPr lang="es-VE"/>
           </a:p>
@@ -2881,7 +2881,7 @@
           <a:p>
             <a:fld id="{3A081D1D-6BD6-40F4-80EB-C898E09F6268}" type="datetimeFigureOut">
               <a:rPr lang="es-VE" smtClean="0"/>
-              <a:t>15/10/2020</a:t>
+              <a:t>19/10/2020</a:t>
             </a:fld>
             <a:endParaRPr lang="es-VE"/>
           </a:p>
@@ -3211,7 +3211,7 @@
           <a:p>
             <a:fld id="{3A081D1D-6BD6-40F4-80EB-C898E09F6268}" type="datetimeFigureOut">
               <a:rPr lang="es-VE" smtClean="0"/>
-              <a:t>15/10/2020</a:t>
+              <a:t>19/10/2020</a:t>
             </a:fld>
             <a:endParaRPr lang="es-VE"/>
           </a:p>
@@ -3602,7 +3602,7 @@
           <a:p>
             <a:fld id="{3A081D1D-6BD6-40F4-80EB-C898E09F6268}" type="datetimeFigureOut">
               <a:rPr lang="es-VE" smtClean="0"/>
-              <a:t>15/10/2020</a:t>
+              <a:t>19/10/2020</a:t>
             </a:fld>
             <a:endParaRPr lang="es-VE"/>
           </a:p>

</xml_diff>